<commit_message>
Changed figure format for publication
</commit_message>
<xml_diff>
--- a/3_isolates/Degradation Sep 2020.pptx
+++ b/3_isolates/Degradation Sep 2020.pptx
@@ -5,10 +5,11 @@
     <p:sldMasterId id="2147483660" r:id="rId1"/>
   </p:sldMasterIdLst>
   <p:notesMasterIdLst>
-    <p:notesMasterId r:id="rId3"/>
+    <p:notesMasterId r:id="rId4"/>
   </p:notesMasterIdLst>
   <p:sldIdLst>
     <p:sldId id="264" r:id="rId2"/>
+    <p:sldId id="265" r:id="rId3"/>
   </p:sldIdLst>
   <p:sldSz cx="6858000" cy="9906000" type="A4"/>
   <p:notesSz cx="6858000" cy="9144000"/>
@@ -118,9 +119,342 @@
 <file path=ppt/revisionInfo.xml><?xml version="1.0" encoding="utf-8"?>
 <p1510:revInfo xmlns:a="http://schemas.openxmlformats.org/drawingml/2006/main" xmlns:r="http://schemas.openxmlformats.org/officeDocument/2006/relationships" xmlns:p1510="http://schemas.microsoft.com/office/powerpoint/2015/10/main">
   <p1510:revLst>
-    <p1510:client id="{32DACF16-F2C0-2F4F-BFAB-3035B3BCA79F}" v="59" dt="2020-09-21T17:09:46.697"/>
+    <p1510:client id="{883BCD79-FD21-7C46-8646-E10057F9068D}" v="26" dt="2021-04-11T16:42:19.027"/>
   </p1510:revLst>
 </p1510:revInfo>
+</file>
+
+<file path=ppt/changesInfos/changesInfo1.xml><?xml version="1.0" encoding="utf-8"?>
+<pc:chgInfo xmlns:a="http://schemas.openxmlformats.org/drawingml/2006/main" xmlns:r="http://schemas.openxmlformats.org/officeDocument/2006/relationships" xmlns:ac="http://schemas.microsoft.com/office/drawing/2013/main/command" xmlns:pc="http://schemas.microsoft.com/office/powerpoint/2013/main/command">
+  <pc:docChgLst>
+    <pc:chgData name="Robyn Wright" userId="b126de916a897153" providerId="LiveId" clId="{883BCD79-FD21-7C46-8646-E10057F9068D}"/>
+    <pc:docChg chg="addSld modSld">
+      <pc:chgData name="Robyn Wright" userId="b126de916a897153" providerId="LiveId" clId="{883BCD79-FD21-7C46-8646-E10057F9068D}" dt="2021-04-11T16:42:19.027" v="26" actId="478"/>
+      <pc:docMkLst>
+        <pc:docMk/>
+      </pc:docMkLst>
+      <pc:sldChg chg="addSp delSp modSp add">
+        <pc:chgData name="Robyn Wright" userId="b126de916a897153" providerId="LiveId" clId="{883BCD79-FD21-7C46-8646-E10057F9068D}" dt="2021-04-11T16:42:19.027" v="26" actId="478"/>
+        <pc:sldMkLst>
+          <pc:docMk/>
+          <pc:sldMk cId="1984288247" sldId="265"/>
+        </pc:sldMkLst>
+        <pc:spChg chg="del mod">
+          <ac:chgData name="Robyn Wright" userId="b126de916a897153" providerId="LiveId" clId="{883BCD79-FD21-7C46-8646-E10057F9068D}" dt="2021-04-11T16:41:52.730" v="9" actId="478"/>
+          <ac:spMkLst>
+            <pc:docMk/>
+            <pc:sldMk cId="1984288247" sldId="265"/>
+            <ac:spMk id="15" creationId="{1DBE555D-F2C9-DB41-A92E-61BC79145629}"/>
+          </ac:spMkLst>
+        </pc:spChg>
+        <pc:spChg chg="del">
+          <ac:chgData name="Robyn Wright" userId="b126de916a897153" providerId="LiveId" clId="{883BCD79-FD21-7C46-8646-E10057F9068D}" dt="2021-04-11T16:42:00.942" v="16" actId="478"/>
+          <ac:spMkLst>
+            <pc:docMk/>
+            <pc:sldMk cId="1984288247" sldId="265"/>
+            <ac:spMk id="39" creationId="{C9E29A30-C4DD-F545-A126-C42056693B60}"/>
+          </ac:spMkLst>
+        </pc:spChg>
+        <pc:spChg chg="del">
+          <ac:chgData name="Robyn Wright" userId="b126de916a897153" providerId="LiveId" clId="{883BCD79-FD21-7C46-8646-E10057F9068D}" dt="2021-04-11T16:41:39.481" v="2" actId="478"/>
+          <ac:spMkLst>
+            <pc:docMk/>
+            <pc:sldMk cId="1984288247" sldId="265"/>
+            <ac:spMk id="96" creationId="{969E77B3-7CE7-DD4F-8A9E-FF0C85271D30}"/>
+          </ac:spMkLst>
+        </pc:spChg>
+        <pc:spChg chg="del">
+          <ac:chgData name="Robyn Wright" userId="b126de916a897153" providerId="LiveId" clId="{883BCD79-FD21-7C46-8646-E10057F9068D}" dt="2021-04-11T16:41:59.098" v="15" actId="478"/>
+          <ac:spMkLst>
+            <pc:docMk/>
+            <pc:sldMk cId="1984288247" sldId="265"/>
+            <ac:spMk id="147" creationId="{B2E0D940-B8CF-9C43-B060-896F13864233}"/>
+          </ac:spMkLst>
+        </pc:spChg>
+        <pc:spChg chg="del">
+          <ac:chgData name="Robyn Wright" userId="b126de916a897153" providerId="LiveId" clId="{883BCD79-FD21-7C46-8646-E10057F9068D}" dt="2021-04-11T16:42:12.649" v="21" actId="478"/>
+          <ac:spMkLst>
+            <pc:docMk/>
+            <pc:sldMk cId="1984288247" sldId="265"/>
+            <ac:spMk id="166" creationId="{BB18481D-3A88-7A48-ABFC-D9909E15F52F}"/>
+          </ac:spMkLst>
+        </pc:spChg>
+        <pc:spChg chg="del">
+          <ac:chgData name="Robyn Wright" userId="b126de916a897153" providerId="LiveId" clId="{883BCD79-FD21-7C46-8646-E10057F9068D}" dt="2021-04-11T16:42:12.649" v="21" actId="478"/>
+          <ac:spMkLst>
+            <pc:docMk/>
+            <pc:sldMk cId="1984288247" sldId="265"/>
+            <ac:spMk id="167" creationId="{8EE08CEA-AA6E-864B-BC9A-0B530927570E}"/>
+          </ac:spMkLst>
+        </pc:spChg>
+        <pc:spChg chg="del">
+          <ac:chgData name="Robyn Wright" userId="b126de916a897153" providerId="LiveId" clId="{883BCD79-FD21-7C46-8646-E10057F9068D}" dt="2021-04-11T16:42:15.518" v="22" actId="478"/>
+          <ac:spMkLst>
+            <pc:docMk/>
+            <pc:sldMk cId="1984288247" sldId="265"/>
+            <ac:spMk id="168" creationId="{53816EAA-087D-DF44-B37C-7D00ABC10BBD}"/>
+          </ac:spMkLst>
+        </pc:spChg>
+        <pc:spChg chg="del">
+          <ac:chgData name="Robyn Wright" userId="b126de916a897153" providerId="LiveId" clId="{883BCD79-FD21-7C46-8646-E10057F9068D}" dt="2021-04-11T16:41:41.386" v="3" actId="478"/>
+          <ac:spMkLst>
+            <pc:docMk/>
+            <pc:sldMk cId="1984288247" sldId="265"/>
+            <ac:spMk id="172" creationId="{E6896585-AF54-3249-A87E-2765408882C9}"/>
+          </ac:spMkLst>
+        </pc:spChg>
+        <pc:grpChg chg="del">
+          <ac:chgData name="Robyn Wright" userId="b126de916a897153" providerId="LiveId" clId="{883BCD79-FD21-7C46-8646-E10057F9068D}" dt="2021-04-11T16:41:56.045" v="12" actId="478"/>
+          <ac:grpSpMkLst>
+            <pc:docMk/>
+            <pc:sldMk cId="1984288247" sldId="265"/>
+            <ac:grpSpMk id="67" creationId="{D516FE66-FA6A-EC49-B9FB-07B709832009}"/>
+          </ac:grpSpMkLst>
+        </pc:grpChg>
+        <pc:grpChg chg="del">
+          <ac:chgData name="Robyn Wright" userId="b126de916a897153" providerId="LiveId" clId="{883BCD79-FD21-7C46-8646-E10057F9068D}" dt="2021-04-11T16:41:57.016" v="13" actId="478"/>
+          <ac:grpSpMkLst>
+            <pc:docMk/>
+            <pc:sldMk cId="1984288247" sldId="265"/>
+            <ac:grpSpMk id="123" creationId="{4DA5F1C5-9CBF-4144-A5E1-CA0129F69545}"/>
+          </ac:grpSpMkLst>
+        </pc:grpChg>
+        <pc:grpChg chg="del">
+          <ac:chgData name="Robyn Wright" userId="b126de916a897153" providerId="LiveId" clId="{883BCD79-FD21-7C46-8646-E10057F9068D}" dt="2021-04-11T16:41:54.765" v="11" actId="478"/>
+          <ac:grpSpMkLst>
+            <pc:docMk/>
+            <pc:sldMk cId="1984288247" sldId="265"/>
+            <ac:grpSpMk id="142" creationId="{CC66774D-728A-0245-9FC1-FE677FD1497C}"/>
+          </ac:grpSpMkLst>
+        </pc:grpChg>
+        <pc:picChg chg="del">
+          <ac:chgData name="Robyn Wright" userId="b126de916a897153" providerId="LiveId" clId="{883BCD79-FD21-7C46-8646-E10057F9068D}" dt="2021-04-11T16:41:39.481" v="2" actId="478"/>
+          <ac:picMkLst>
+            <pc:docMk/>
+            <pc:sldMk cId="1984288247" sldId="265"/>
+            <ac:picMk id="4" creationId="{EFDFCDAC-48A9-4C43-A0F6-5F2084462ACD}"/>
+          </ac:picMkLst>
+        </pc:picChg>
+        <pc:picChg chg="del">
+          <ac:chgData name="Robyn Wright" userId="b126de916a897153" providerId="LiveId" clId="{883BCD79-FD21-7C46-8646-E10057F9068D}" dt="2021-04-11T16:42:19.027" v="26" actId="478"/>
+          <ac:picMkLst>
+            <pc:docMk/>
+            <pc:sldMk cId="1984288247" sldId="265"/>
+            <ac:picMk id="5" creationId="{ACDAC6DD-F7C3-744C-AFF7-FBCD1C37EB9F}"/>
+          </ac:picMkLst>
+        </pc:picChg>
+        <pc:picChg chg="del">
+          <ac:chgData name="Robyn Wright" userId="b126de916a897153" providerId="LiveId" clId="{883BCD79-FD21-7C46-8646-E10057F9068D}" dt="2021-04-11T16:41:39.481" v="2" actId="478"/>
+          <ac:picMkLst>
+            <pc:docMk/>
+            <pc:sldMk cId="1984288247" sldId="265"/>
+            <ac:picMk id="6" creationId="{498BC392-9E2D-7E43-9961-5A1EFD7C60EF}"/>
+          </ac:picMkLst>
+        </pc:picChg>
+        <pc:picChg chg="del">
+          <ac:chgData name="Robyn Wright" userId="b126de916a897153" providerId="LiveId" clId="{883BCD79-FD21-7C46-8646-E10057F9068D}" dt="2021-04-11T16:42:18.098" v="25" actId="478"/>
+          <ac:picMkLst>
+            <pc:docMk/>
+            <pc:sldMk cId="1984288247" sldId="265"/>
+            <ac:picMk id="7" creationId="{520A6D35-D9B7-6846-A441-1BD34D705EA5}"/>
+          </ac:picMkLst>
+        </pc:picChg>
+        <pc:picChg chg="del">
+          <ac:chgData name="Robyn Wright" userId="b126de916a897153" providerId="LiveId" clId="{883BCD79-FD21-7C46-8646-E10057F9068D}" dt="2021-04-11T16:41:53.931" v="10" actId="478"/>
+          <ac:picMkLst>
+            <pc:docMk/>
+            <pc:sldMk cId="1984288247" sldId="265"/>
+            <ac:picMk id="30" creationId="{3D8D1B67-F27B-0F45-B721-B146DF2D153D}"/>
+          </ac:picMkLst>
+        </pc:picChg>
+        <pc:picChg chg="del">
+          <ac:chgData name="Robyn Wright" userId="b126de916a897153" providerId="LiveId" clId="{883BCD79-FD21-7C46-8646-E10057F9068D}" dt="2021-04-11T16:41:57.859" v="14" actId="478"/>
+          <ac:picMkLst>
+            <pc:docMk/>
+            <pc:sldMk cId="1984288247" sldId="265"/>
+            <ac:picMk id="35" creationId="{C957091F-FCA2-5449-8746-4257A51AA7ED}"/>
+          </ac:picMkLst>
+        </pc:picChg>
+        <pc:picChg chg="del">
+          <ac:chgData name="Robyn Wright" userId="b126de916a897153" providerId="LiveId" clId="{883BCD79-FD21-7C46-8646-E10057F9068D}" dt="2021-04-11T16:42:00.942" v="16" actId="478"/>
+          <ac:picMkLst>
+            <pc:docMk/>
+            <pc:sldMk cId="1984288247" sldId="265"/>
+            <ac:picMk id="38" creationId="{C13960D5-D42B-5344-9BB4-3331B509D07E}"/>
+          </ac:picMkLst>
+        </pc:picChg>
+        <pc:picChg chg="del">
+          <ac:chgData name="Robyn Wright" userId="b126de916a897153" providerId="LiveId" clId="{883BCD79-FD21-7C46-8646-E10057F9068D}" dt="2021-04-11T16:42:05.619" v="18" actId="478"/>
+          <ac:picMkLst>
+            <pc:docMk/>
+            <pc:sldMk cId="1984288247" sldId="265"/>
+            <ac:picMk id="68" creationId="{8B0B1A90-D840-F242-8C2C-74EFE9759539}"/>
+          </ac:picMkLst>
+        </pc:picChg>
+        <pc:picChg chg="del">
+          <ac:chgData name="Robyn Wright" userId="b126de916a897153" providerId="LiveId" clId="{883BCD79-FD21-7C46-8646-E10057F9068D}" dt="2021-04-11T16:42:05.619" v="18" actId="478"/>
+          <ac:picMkLst>
+            <pc:docMk/>
+            <pc:sldMk cId="1984288247" sldId="265"/>
+            <ac:picMk id="70" creationId="{0292C6E7-D2E4-D14A-867D-6DA5AAE96D3E}"/>
+          </ac:picMkLst>
+        </pc:picChg>
+        <pc:picChg chg="del">
+          <ac:chgData name="Robyn Wright" userId="b126de916a897153" providerId="LiveId" clId="{883BCD79-FD21-7C46-8646-E10057F9068D}" dt="2021-04-11T16:42:05.619" v="18" actId="478"/>
+          <ac:picMkLst>
+            <pc:docMk/>
+            <pc:sldMk cId="1984288247" sldId="265"/>
+            <ac:picMk id="72" creationId="{8E11A081-6D9E-724D-84A0-13849D86E56B}"/>
+          </ac:picMkLst>
+        </pc:picChg>
+        <pc:picChg chg="del">
+          <ac:chgData name="Robyn Wright" userId="b126de916a897153" providerId="LiveId" clId="{883BCD79-FD21-7C46-8646-E10057F9068D}" dt="2021-04-11T16:42:12.649" v="21" actId="478"/>
+          <ac:picMkLst>
+            <pc:docMk/>
+            <pc:sldMk cId="1984288247" sldId="265"/>
+            <ac:picMk id="89" creationId="{220AF4A9-4CDA-0B4A-B5FC-5EF825118CBF}"/>
+          </ac:picMkLst>
+        </pc:picChg>
+        <pc:picChg chg="del">
+          <ac:chgData name="Robyn Wright" userId="b126de916a897153" providerId="LiveId" clId="{883BCD79-FD21-7C46-8646-E10057F9068D}" dt="2021-04-11T16:42:12.649" v="21" actId="478"/>
+          <ac:picMkLst>
+            <pc:docMk/>
+            <pc:sldMk cId="1984288247" sldId="265"/>
+            <ac:picMk id="90" creationId="{7E82292C-AA17-F540-8154-C299B7B463BD}"/>
+          </ac:picMkLst>
+        </pc:picChg>
+        <pc:picChg chg="del">
+          <ac:chgData name="Robyn Wright" userId="b126de916a897153" providerId="LiveId" clId="{883BCD79-FD21-7C46-8646-E10057F9068D}" dt="2021-04-11T16:41:36.660" v="1" actId="478"/>
+          <ac:picMkLst>
+            <pc:docMk/>
+            <pc:sldMk cId="1984288247" sldId="265"/>
+            <ac:picMk id="112" creationId="{F49CC0BE-327D-BE48-AAF4-CE14FCBFAE5D}"/>
+          </ac:picMkLst>
+        </pc:picChg>
+        <pc:picChg chg="del">
+          <ac:chgData name="Robyn Wright" userId="b126de916a897153" providerId="LiveId" clId="{883BCD79-FD21-7C46-8646-E10057F9068D}" dt="2021-04-11T16:41:36.660" v="1" actId="478"/>
+          <ac:picMkLst>
+            <pc:docMk/>
+            <pc:sldMk cId="1984288247" sldId="265"/>
+            <ac:picMk id="114" creationId="{DB8A9A3B-85DB-5948-AECF-1C1C6D24C9CC}"/>
+          </ac:picMkLst>
+        </pc:picChg>
+        <pc:picChg chg="add del">
+          <ac:chgData name="Robyn Wright" userId="b126de916a897153" providerId="LiveId" clId="{883BCD79-FD21-7C46-8646-E10057F9068D}" dt="2021-04-11T16:41:48.659" v="7" actId="478"/>
+          <ac:picMkLst>
+            <pc:docMk/>
+            <pc:sldMk cId="1984288247" sldId="265"/>
+            <ac:picMk id="153" creationId="{AB542A52-08FB-8940-9108-4B7A7D0A0C69}"/>
+          </ac:picMkLst>
+        </pc:picChg>
+        <pc:picChg chg="del">
+          <ac:chgData name="Robyn Wright" userId="b126de916a897153" providerId="LiveId" clId="{883BCD79-FD21-7C46-8646-E10057F9068D}" dt="2021-04-11T16:42:05.619" v="18" actId="478"/>
+          <ac:picMkLst>
+            <pc:docMk/>
+            <pc:sldMk cId="1984288247" sldId="265"/>
+            <ac:picMk id="165" creationId="{D459D525-960C-6346-8561-48A22B1DC502}"/>
+          </ac:picMkLst>
+        </pc:picChg>
+        <pc:picChg chg="del">
+          <ac:chgData name="Robyn Wright" userId="b126de916a897153" providerId="LiveId" clId="{883BCD79-FD21-7C46-8646-E10057F9068D}" dt="2021-04-11T16:42:17.098" v="24" actId="478"/>
+          <ac:picMkLst>
+            <pc:docMk/>
+            <pc:sldMk cId="1984288247" sldId="265"/>
+            <ac:picMk id="169" creationId="{842B6B62-BF3E-CD41-AF54-79A1749EAE9E}"/>
+          </ac:picMkLst>
+        </pc:picChg>
+        <pc:picChg chg="del">
+          <ac:chgData name="Robyn Wright" userId="b126de916a897153" providerId="LiveId" clId="{883BCD79-FD21-7C46-8646-E10057F9068D}" dt="2021-04-11T16:42:16.302" v="23" actId="478"/>
+          <ac:picMkLst>
+            <pc:docMk/>
+            <pc:sldMk cId="1984288247" sldId="265"/>
+            <ac:picMk id="184" creationId="{55701358-3598-7040-B370-E5DAAD3CC4BF}"/>
+          </ac:picMkLst>
+        </pc:picChg>
+        <pc:picChg chg="del">
+          <ac:chgData name="Robyn Wright" userId="b126de916a897153" providerId="LiveId" clId="{883BCD79-FD21-7C46-8646-E10057F9068D}" dt="2021-04-11T16:42:07.525" v="19" actId="478"/>
+          <ac:picMkLst>
+            <pc:docMk/>
+            <pc:sldMk cId="1984288247" sldId="265"/>
+            <ac:picMk id="186" creationId="{41C95DC1-5193-214E-95E0-1386E2BC0815}"/>
+          </ac:picMkLst>
+        </pc:picChg>
+        <pc:picChg chg="del">
+          <ac:chgData name="Robyn Wright" userId="b126de916a897153" providerId="LiveId" clId="{883BCD79-FD21-7C46-8646-E10057F9068D}" dt="2021-04-11T16:42:09.149" v="20" actId="478"/>
+          <ac:picMkLst>
+            <pc:docMk/>
+            <pc:sldMk cId="1984288247" sldId="265"/>
+            <ac:picMk id="189" creationId="{7FC50CEE-EF4E-0F4D-80D1-7EFEF6DE2C3C}"/>
+          </ac:picMkLst>
+        </pc:picChg>
+        <pc:picChg chg="del">
+          <ac:chgData name="Robyn Wright" userId="b126de916a897153" providerId="LiveId" clId="{883BCD79-FD21-7C46-8646-E10057F9068D}" dt="2021-04-11T16:42:12.649" v="21" actId="478"/>
+          <ac:picMkLst>
+            <pc:docMk/>
+            <pc:sldMk cId="1984288247" sldId="265"/>
+            <ac:picMk id="192" creationId="{BB1B36F9-AF76-BC43-8E36-DB12A88A2363}"/>
+          </ac:picMkLst>
+        </pc:picChg>
+        <pc:picChg chg="del">
+          <ac:chgData name="Robyn Wright" userId="b126de916a897153" providerId="LiveId" clId="{883BCD79-FD21-7C46-8646-E10057F9068D}" dt="2021-04-11T16:42:02.471" v="17" actId="478"/>
+          <ac:picMkLst>
+            <pc:docMk/>
+            <pc:sldMk cId="1984288247" sldId="265"/>
+            <ac:picMk id="194" creationId="{979AE098-8073-2249-80F2-A69D1389E2DD}"/>
+          </ac:picMkLst>
+        </pc:picChg>
+        <pc:cxnChg chg="del">
+          <ac:chgData name="Robyn Wright" userId="b126de916a897153" providerId="LiveId" clId="{883BCD79-FD21-7C46-8646-E10057F9068D}" dt="2021-04-11T16:42:15.518" v="22" actId="478"/>
+          <ac:cxnSpMkLst>
+            <pc:docMk/>
+            <pc:sldMk cId="1984288247" sldId="265"/>
+            <ac:cxnSpMk id="91" creationId="{456DA3FD-4175-1E47-8061-9E21201114EF}"/>
+          </ac:cxnSpMkLst>
+        </pc:cxnChg>
+        <pc:cxnChg chg="del">
+          <ac:chgData name="Robyn Wright" userId="b126de916a897153" providerId="LiveId" clId="{883BCD79-FD21-7C46-8646-E10057F9068D}" dt="2021-04-11T16:42:12.649" v="21" actId="478"/>
+          <ac:cxnSpMkLst>
+            <pc:docMk/>
+            <pc:sldMk cId="1984288247" sldId="265"/>
+            <ac:cxnSpMk id="92" creationId="{5DAE5943-C158-244B-A357-1F701FA9AD0D}"/>
+          </ac:cxnSpMkLst>
+        </pc:cxnChg>
+        <pc:cxnChg chg="del">
+          <ac:chgData name="Robyn Wright" userId="b126de916a897153" providerId="LiveId" clId="{883BCD79-FD21-7C46-8646-E10057F9068D}" dt="2021-04-11T16:42:15.518" v="22" actId="478"/>
+          <ac:cxnSpMkLst>
+            <pc:docMk/>
+            <pc:sldMk cId="1984288247" sldId="265"/>
+            <ac:cxnSpMk id="93" creationId="{1A95F307-4F06-6949-903B-D2C50B79BED0}"/>
+          </ac:cxnSpMkLst>
+        </pc:cxnChg>
+        <pc:cxnChg chg="del">
+          <ac:chgData name="Robyn Wright" userId="b126de916a897153" providerId="LiveId" clId="{883BCD79-FD21-7C46-8646-E10057F9068D}" dt="2021-04-11T16:41:43.783" v="5" actId="478"/>
+          <ac:cxnSpMkLst>
+            <pc:docMk/>
+            <pc:sldMk cId="1984288247" sldId="265"/>
+            <ac:cxnSpMk id="106" creationId="{32054C47-67A2-B34E-B4C1-3E55F1B380DE}"/>
+          </ac:cxnSpMkLst>
+        </pc:cxnChg>
+        <pc:cxnChg chg="del">
+          <ac:chgData name="Robyn Wright" userId="b126de916a897153" providerId="LiveId" clId="{883BCD79-FD21-7C46-8646-E10057F9068D}" dt="2021-04-11T16:41:39.481" v="2" actId="478"/>
+          <ac:cxnSpMkLst>
+            <pc:docMk/>
+            <pc:sldMk cId="1984288247" sldId="265"/>
+            <ac:cxnSpMk id="109" creationId="{17B4D2EC-98FB-064A-A519-905849A660CC}"/>
+          </ac:cxnSpMkLst>
+        </pc:cxnChg>
+        <pc:cxnChg chg="del">
+          <ac:chgData name="Robyn Wright" userId="b126de916a897153" providerId="LiveId" clId="{883BCD79-FD21-7C46-8646-E10057F9068D}" dt="2021-04-11T16:41:42.403" v="4" actId="478"/>
+          <ac:cxnSpMkLst>
+            <pc:docMk/>
+            <pc:sldMk cId="1984288247" sldId="265"/>
+            <ac:cxnSpMk id="173" creationId="{B84CA0EB-FF79-8740-B0BC-59FDB9B434E3}"/>
+          </ac:cxnSpMkLst>
+        </pc:cxnChg>
+      </pc:sldChg>
+    </pc:docChg>
+  </pc:docChgLst>
+</pc:chgInfo>
 </file>
 
 <file path=ppt/notesMasters/notesMaster1.xml><?xml version="1.0" encoding="utf-8"?>
@@ -205,7 +539,7 @@
           <a:p>
             <a:fld id="{8D0EB668-9A75-E644-9CE9-59AE31848407}" type="datetimeFigureOut">
               <a:rPr lang="en-US" smtClean="0"/>
-              <a:t>10/14/20</a:t>
+              <a:t>4/11/21</a:t>
             </a:fld>
             <a:endParaRPr lang="en-US"/>
           </a:p>
@@ -557,6 +891,90 @@
 </p:notes>
 </file>
 
+<file path=ppt/notesSlides/notesSlide2.xml><?xml version="1.0" encoding="utf-8"?>
+<p:notes xmlns:a="http://schemas.openxmlformats.org/drawingml/2006/main" xmlns:r="http://schemas.openxmlformats.org/officeDocument/2006/relationships" xmlns:p="http://schemas.openxmlformats.org/presentationml/2006/main">
+  <p:cSld>
+    <p:spTree>
+      <p:nvGrpSpPr>
+        <p:cNvPr id="1" name=""/>
+        <p:cNvGrpSpPr/>
+        <p:nvPr/>
+      </p:nvGrpSpPr>
+      <p:grpSpPr>
+        <a:xfrm>
+          <a:off x="0" y="0"/>
+          <a:ext cx="0" cy="0"/>
+          <a:chOff x="0" y="0"/>
+          <a:chExt cx="0" cy="0"/>
+        </a:xfrm>
+      </p:grpSpPr>
+      <p:sp>
+        <p:nvSpPr>
+          <p:cNvPr id="2" name="Slide Image Placeholder 1"/>
+          <p:cNvSpPr>
+            <a:spLocks noGrp="1" noRot="1" noChangeAspect="1"/>
+          </p:cNvSpPr>
+          <p:nvPr>
+            <p:ph type="sldImg"/>
+          </p:nvPr>
+        </p:nvSpPr>
+        <p:spPr/>
+      </p:sp>
+      <p:sp>
+        <p:nvSpPr>
+          <p:cNvPr id="3" name="Notes Placeholder 2"/>
+          <p:cNvSpPr>
+            <a:spLocks noGrp="1"/>
+          </p:cNvSpPr>
+          <p:nvPr>
+            <p:ph type="body" idx="1"/>
+          </p:nvPr>
+        </p:nvSpPr>
+        <p:spPr/>
+        <p:txBody>
+          <a:bodyPr/>
+          <a:lstStyle/>
+          <a:p>
+            <a:endParaRPr lang="en-US" dirty="0"/>
+          </a:p>
+        </p:txBody>
+      </p:sp>
+      <p:sp>
+        <p:nvSpPr>
+          <p:cNvPr id="4" name="Slide Number Placeholder 3"/>
+          <p:cNvSpPr>
+            <a:spLocks noGrp="1"/>
+          </p:cNvSpPr>
+          <p:nvPr>
+            <p:ph type="sldNum" sz="quarter" idx="5"/>
+          </p:nvPr>
+        </p:nvSpPr>
+        <p:spPr/>
+        <p:txBody>
+          <a:bodyPr/>
+          <a:lstStyle/>
+          <a:p>
+            <a:fld id="{FC4B1A21-FD2F-5F40-98C2-299E67B4EAF6}" type="slidenum">
+              <a:rPr lang="en-US" smtClean="0"/>
+              <a:t>2</a:t>
+            </a:fld>
+            <a:endParaRPr lang="en-US"/>
+          </a:p>
+        </p:txBody>
+      </p:sp>
+    </p:spTree>
+    <p:extLst>
+      <p:ext uri="{BB962C8B-B14F-4D97-AF65-F5344CB8AC3E}">
+        <p14:creationId xmlns:p14="http://schemas.microsoft.com/office/powerpoint/2010/main" val="1380740612"/>
+      </p:ext>
+    </p:extLst>
+  </p:cSld>
+  <p:clrMapOvr>
+    <a:masterClrMapping/>
+  </p:clrMapOvr>
+</p:notes>
+</file>
+
 <file path=ppt/slideLayouts/slideLayout1.xml><?xml version="1.0" encoding="utf-8"?>
 <p:sldLayout xmlns:a="http://schemas.openxmlformats.org/drawingml/2006/main" xmlns:r="http://schemas.openxmlformats.org/officeDocument/2006/relationships" xmlns:p="http://schemas.openxmlformats.org/presentationml/2006/main" type="title" preserve="1">
   <p:cSld name="Title Slide">
@@ -688,7 +1106,7 @@
           <a:p>
             <a:fld id="{629CF140-EA73-5040-A33C-8C772358294B}" type="datetimeFigureOut">
               <a:rPr lang="en-US" smtClean="0"/>
-              <a:t>10/14/20</a:t>
+              <a:t>4/11/21</a:t>
             </a:fld>
             <a:endParaRPr lang="en-US"/>
           </a:p>
@@ -858,7 +1276,7 @@
           <a:p>
             <a:fld id="{629CF140-EA73-5040-A33C-8C772358294B}" type="datetimeFigureOut">
               <a:rPr lang="en-US" smtClean="0"/>
-              <a:t>10/14/20</a:t>
+              <a:t>4/11/21</a:t>
             </a:fld>
             <a:endParaRPr lang="en-US"/>
           </a:p>
@@ -1038,7 +1456,7 @@
           <a:p>
             <a:fld id="{629CF140-EA73-5040-A33C-8C772358294B}" type="datetimeFigureOut">
               <a:rPr lang="en-US" smtClean="0"/>
-              <a:t>10/14/20</a:t>
+              <a:t>4/11/21</a:t>
             </a:fld>
             <a:endParaRPr lang="en-US"/>
           </a:p>
@@ -1208,7 +1626,7 @@
           <a:p>
             <a:fld id="{629CF140-EA73-5040-A33C-8C772358294B}" type="datetimeFigureOut">
               <a:rPr lang="en-US" smtClean="0"/>
-              <a:t>10/14/20</a:t>
+              <a:t>4/11/21</a:t>
             </a:fld>
             <a:endParaRPr lang="en-US"/>
           </a:p>
@@ -1452,7 +1870,7 @@
           <a:p>
             <a:fld id="{629CF140-EA73-5040-A33C-8C772358294B}" type="datetimeFigureOut">
               <a:rPr lang="en-US" smtClean="0"/>
-              <a:t>10/14/20</a:t>
+              <a:t>4/11/21</a:t>
             </a:fld>
             <a:endParaRPr lang="en-US"/>
           </a:p>
@@ -1684,7 +2102,7 @@
           <a:p>
             <a:fld id="{629CF140-EA73-5040-A33C-8C772358294B}" type="datetimeFigureOut">
               <a:rPr lang="en-US" smtClean="0"/>
-              <a:t>10/14/20</a:t>
+              <a:t>4/11/21</a:t>
             </a:fld>
             <a:endParaRPr lang="en-US"/>
           </a:p>
@@ -2051,7 +2469,7 @@
           <a:p>
             <a:fld id="{629CF140-EA73-5040-A33C-8C772358294B}" type="datetimeFigureOut">
               <a:rPr lang="en-US" smtClean="0"/>
-              <a:t>10/14/20</a:t>
+              <a:t>4/11/21</a:t>
             </a:fld>
             <a:endParaRPr lang="en-US"/>
           </a:p>
@@ -2169,7 +2587,7 @@
           <a:p>
             <a:fld id="{629CF140-EA73-5040-A33C-8C772358294B}" type="datetimeFigureOut">
               <a:rPr lang="en-US" smtClean="0"/>
-              <a:t>10/14/20</a:t>
+              <a:t>4/11/21</a:t>
             </a:fld>
             <a:endParaRPr lang="en-US"/>
           </a:p>
@@ -2264,7 +2682,7 @@
           <a:p>
             <a:fld id="{629CF140-EA73-5040-A33C-8C772358294B}" type="datetimeFigureOut">
               <a:rPr lang="en-US" smtClean="0"/>
-              <a:t>10/14/20</a:t>
+              <a:t>4/11/21</a:t>
             </a:fld>
             <a:endParaRPr lang="en-US"/>
           </a:p>
@@ -2541,7 +2959,7 @@
           <a:p>
             <a:fld id="{629CF140-EA73-5040-A33C-8C772358294B}" type="datetimeFigureOut">
               <a:rPr lang="en-US" smtClean="0"/>
-              <a:t>10/14/20</a:t>
+              <a:t>4/11/21</a:t>
             </a:fld>
             <a:endParaRPr lang="en-US"/>
           </a:p>
@@ -2798,7 +3216,7 @@
           <a:p>
             <a:fld id="{629CF140-EA73-5040-A33C-8C772358294B}" type="datetimeFigureOut">
               <a:rPr lang="en-US" smtClean="0"/>
-              <a:t>10/14/20</a:t>
+              <a:t>4/11/21</a:t>
             </a:fld>
             <a:endParaRPr lang="en-US"/>
           </a:p>
@@ -3011,7 +3429,7 @@
           <a:p>
             <a:fld id="{629CF140-EA73-5040-A33C-8C772358294B}" type="datetimeFigureOut">
               <a:rPr lang="en-US" smtClean="0"/>
-              <a:t>10/14/20</a:t>
+              <a:t>4/11/21</a:t>
             </a:fld>
             <a:endParaRPr lang="en-US"/>
           </a:p>
@@ -6792,6 +7210,1768 @@
     <p:extLst>
       <p:ext uri="{BB962C8B-B14F-4D97-AF65-F5344CB8AC3E}">
         <p14:creationId xmlns:p14="http://schemas.microsoft.com/office/powerpoint/2010/main" val="3126049724"/>
+      </p:ext>
+    </p:extLst>
+  </p:cSld>
+  <p:clrMapOvr>
+    <a:masterClrMapping/>
+  </p:clrMapOvr>
+</p:sld>
+</file>
+
+<file path=ppt/slides/slide2.xml><?xml version="1.0" encoding="utf-8"?>
+<p:sld xmlns:a="http://schemas.openxmlformats.org/drawingml/2006/main" xmlns:r="http://schemas.openxmlformats.org/officeDocument/2006/relationships" xmlns:p="http://schemas.openxmlformats.org/presentationml/2006/main">
+  <p:cSld>
+    <p:spTree>
+      <p:nvGrpSpPr>
+        <p:cNvPr id="1" name=""/>
+        <p:cNvGrpSpPr/>
+        <p:nvPr/>
+      </p:nvGrpSpPr>
+      <p:grpSpPr>
+        <a:xfrm>
+          <a:off x="0" y="0"/>
+          <a:ext cx="0" cy="0"/>
+          <a:chOff x="0" y="0"/>
+          <a:chExt cx="0" cy="0"/>
+        </a:xfrm>
+      </p:grpSpPr>
+      <p:sp>
+        <p:nvSpPr>
+          <p:cNvPr id="73" name="Rectangle 72">
+            <a:extLst>
+              <a:ext uri="{FF2B5EF4-FFF2-40B4-BE49-F238E27FC236}">
+                <a16:creationId xmlns:a16="http://schemas.microsoft.com/office/drawing/2014/main" id="{D70CE68F-3062-DE45-A104-554921417C6A}"/>
+              </a:ext>
+            </a:extLst>
+          </p:cNvPr>
+          <p:cNvSpPr/>
+          <p:nvPr/>
+        </p:nvSpPr>
+        <p:spPr>
+          <a:xfrm>
+            <a:off x="3069000" y="583096"/>
+            <a:ext cx="720000" cy="196552"/>
+          </a:xfrm>
+          <a:prstGeom prst="rect">
+            <a:avLst/>
+          </a:prstGeom>
+          <a:solidFill>
+            <a:schemeClr val="tx1"/>
+          </a:solidFill>
+          <a:ln>
+            <a:noFill/>
+          </a:ln>
+        </p:spPr>
+        <p:style>
+          <a:lnRef idx="2">
+            <a:schemeClr val="accent1">
+              <a:shade val="50000"/>
+            </a:schemeClr>
+          </a:lnRef>
+          <a:fillRef idx="1">
+            <a:schemeClr val="accent1"/>
+          </a:fillRef>
+          <a:effectRef idx="0">
+            <a:schemeClr val="accent1"/>
+          </a:effectRef>
+          <a:fontRef idx="minor">
+            <a:schemeClr val="lt1"/>
+          </a:fontRef>
+        </p:style>
+        <p:txBody>
+          <a:bodyPr rtlCol="0" anchor="ctr"/>
+          <a:lstStyle/>
+          <a:p>
+            <a:pPr algn="ctr"/>
+            <a:r>
+              <a:rPr lang="en-US" sz="1200" dirty="0">
+                <a:solidFill>
+                  <a:schemeClr val="bg1"/>
+                </a:solidFill>
+              </a:rPr>
+              <a:t>PET</a:t>
+            </a:r>
+          </a:p>
+        </p:txBody>
+      </p:sp>
+      <p:sp>
+        <p:nvSpPr>
+          <p:cNvPr id="74" name="Rectangle 73">
+            <a:extLst>
+              <a:ext uri="{FF2B5EF4-FFF2-40B4-BE49-F238E27FC236}">
+                <a16:creationId xmlns:a16="http://schemas.microsoft.com/office/drawing/2014/main" id="{546810A2-A457-F440-80F1-E417534FFDEB}"/>
+              </a:ext>
+            </a:extLst>
+          </p:cNvPr>
+          <p:cNvSpPr/>
+          <p:nvPr/>
+        </p:nvSpPr>
+        <p:spPr>
+          <a:xfrm>
+            <a:off x="3069000" y="1626346"/>
+            <a:ext cx="720000" cy="196552"/>
+          </a:xfrm>
+          <a:prstGeom prst="rect">
+            <a:avLst/>
+          </a:prstGeom>
+          <a:solidFill>
+            <a:schemeClr val="tx1"/>
+          </a:solidFill>
+          <a:ln>
+            <a:noFill/>
+          </a:ln>
+        </p:spPr>
+        <p:style>
+          <a:lnRef idx="2">
+            <a:schemeClr val="accent1">
+              <a:shade val="50000"/>
+            </a:schemeClr>
+          </a:lnRef>
+          <a:fillRef idx="1">
+            <a:schemeClr val="accent1"/>
+          </a:fillRef>
+          <a:effectRef idx="0">
+            <a:schemeClr val="accent1"/>
+          </a:effectRef>
+          <a:fontRef idx="minor">
+            <a:schemeClr val="lt1"/>
+          </a:fontRef>
+        </p:style>
+        <p:txBody>
+          <a:bodyPr rtlCol="0" anchor="ctr"/>
+          <a:lstStyle/>
+          <a:p>
+            <a:pPr algn="ctr"/>
+            <a:r>
+              <a:rPr lang="en-US" sz="1200" dirty="0">
+                <a:solidFill>
+                  <a:schemeClr val="bg1"/>
+                </a:solidFill>
+              </a:rPr>
+              <a:t>BHET</a:t>
+            </a:r>
+          </a:p>
+        </p:txBody>
+      </p:sp>
+      <p:sp>
+        <p:nvSpPr>
+          <p:cNvPr id="75" name="Rectangle 74">
+            <a:extLst>
+              <a:ext uri="{FF2B5EF4-FFF2-40B4-BE49-F238E27FC236}">
+                <a16:creationId xmlns:a16="http://schemas.microsoft.com/office/drawing/2014/main" id="{0CF505E5-466D-3743-8A0F-D0D73B2D4A44}"/>
+              </a:ext>
+            </a:extLst>
+          </p:cNvPr>
+          <p:cNvSpPr/>
+          <p:nvPr/>
+        </p:nvSpPr>
+        <p:spPr>
+          <a:xfrm>
+            <a:off x="3069000" y="2688846"/>
+            <a:ext cx="720000" cy="196552"/>
+          </a:xfrm>
+          <a:prstGeom prst="rect">
+            <a:avLst/>
+          </a:prstGeom>
+          <a:noFill/>
+          <a:ln>
+            <a:noFill/>
+          </a:ln>
+        </p:spPr>
+        <p:style>
+          <a:lnRef idx="2">
+            <a:schemeClr val="accent1">
+              <a:shade val="50000"/>
+            </a:schemeClr>
+          </a:lnRef>
+          <a:fillRef idx="1">
+            <a:schemeClr val="accent1"/>
+          </a:fillRef>
+          <a:effectRef idx="0">
+            <a:schemeClr val="accent1"/>
+          </a:effectRef>
+          <a:fontRef idx="minor">
+            <a:schemeClr val="lt1"/>
+          </a:fontRef>
+        </p:style>
+        <p:txBody>
+          <a:bodyPr rtlCol="0" anchor="ctr"/>
+          <a:lstStyle/>
+          <a:p>
+            <a:pPr algn="ctr"/>
+            <a:r>
+              <a:rPr lang="en-US" sz="1200" dirty="0">
+                <a:solidFill>
+                  <a:schemeClr val="tx1"/>
+                </a:solidFill>
+              </a:rPr>
+              <a:t>MHET</a:t>
+            </a:r>
+          </a:p>
+        </p:txBody>
+      </p:sp>
+      <p:sp>
+        <p:nvSpPr>
+          <p:cNvPr id="76" name="Rectangle 75">
+            <a:extLst>
+              <a:ext uri="{FF2B5EF4-FFF2-40B4-BE49-F238E27FC236}">
+                <a16:creationId xmlns:a16="http://schemas.microsoft.com/office/drawing/2014/main" id="{EFF0681F-C426-264A-B933-9A382467151B}"/>
+              </a:ext>
+            </a:extLst>
+          </p:cNvPr>
+          <p:cNvSpPr/>
+          <p:nvPr/>
+        </p:nvSpPr>
+        <p:spPr>
+          <a:xfrm>
+            <a:off x="3069000" y="4020846"/>
+            <a:ext cx="720000" cy="196552"/>
+          </a:xfrm>
+          <a:prstGeom prst="rect">
+            <a:avLst/>
+          </a:prstGeom>
+          <a:solidFill>
+            <a:schemeClr val="tx1"/>
+          </a:solidFill>
+          <a:ln>
+            <a:noFill/>
+          </a:ln>
+        </p:spPr>
+        <p:style>
+          <a:lnRef idx="2">
+            <a:schemeClr val="accent1">
+              <a:shade val="50000"/>
+            </a:schemeClr>
+          </a:lnRef>
+          <a:fillRef idx="1">
+            <a:schemeClr val="accent1"/>
+          </a:fillRef>
+          <a:effectRef idx="0">
+            <a:schemeClr val="accent1"/>
+          </a:effectRef>
+          <a:fontRef idx="minor">
+            <a:schemeClr val="lt1"/>
+          </a:fontRef>
+        </p:style>
+        <p:txBody>
+          <a:bodyPr rtlCol="0" anchor="ctr"/>
+          <a:lstStyle/>
+          <a:p>
+            <a:pPr algn="ctr"/>
+            <a:r>
+              <a:rPr lang="en-US" sz="1200" dirty="0">
+                <a:solidFill>
+                  <a:schemeClr val="bg1"/>
+                </a:solidFill>
+              </a:rPr>
+              <a:t>TPA</a:t>
+            </a:r>
+          </a:p>
+        </p:txBody>
+      </p:sp>
+      <p:sp>
+        <p:nvSpPr>
+          <p:cNvPr id="77" name="Rectangle 76">
+            <a:extLst>
+              <a:ext uri="{FF2B5EF4-FFF2-40B4-BE49-F238E27FC236}">
+                <a16:creationId xmlns:a16="http://schemas.microsoft.com/office/drawing/2014/main" id="{89F7BBA3-60D7-3B4A-8E9E-4C35E000E9CA}"/>
+              </a:ext>
+            </a:extLst>
+          </p:cNvPr>
+          <p:cNvSpPr/>
+          <p:nvPr/>
+        </p:nvSpPr>
+        <p:spPr>
+          <a:xfrm>
+            <a:off x="1149630" y="1631746"/>
+            <a:ext cx="720000" cy="196552"/>
+          </a:xfrm>
+          <a:prstGeom prst="rect">
+            <a:avLst/>
+          </a:prstGeom>
+          <a:noFill/>
+          <a:ln>
+            <a:noFill/>
+          </a:ln>
+        </p:spPr>
+        <p:style>
+          <a:lnRef idx="2">
+            <a:schemeClr val="accent1">
+              <a:shade val="50000"/>
+            </a:schemeClr>
+          </a:lnRef>
+          <a:fillRef idx="1">
+            <a:schemeClr val="accent1"/>
+          </a:fillRef>
+          <a:effectRef idx="0">
+            <a:schemeClr val="accent1"/>
+          </a:effectRef>
+          <a:fontRef idx="minor">
+            <a:schemeClr val="lt1"/>
+          </a:fontRef>
+        </p:style>
+        <p:txBody>
+          <a:bodyPr rtlCol="0" anchor="ctr"/>
+          <a:lstStyle/>
+          <a:p>
+            <a:pPr algn="ctr"/>
+            <a:r>
+              <a:rPr lang="en-US" sz="1200" dirty="0">
+                <a:solidFill>
+                  <a:schemeClr val="tx1"/>
+                </a:solidFill>
+              </a:rPr>
+              <a:t>EG</a:t>
+            </a:r>
+          </a:p>
+        </p:txBody>
+      </p:sp>
+      <p:sp>
+        <p:nvSpPr>
+          <p:cNvPr id="78" name="Rectangle 77">
+            <a:extLst>
+              <a:ext uri="{FF2B5EF4-FFF2-40B4-BE49-F238E27FC236}">
+                <a16:creationId xmlns:a16="http://schemas.microsoft.com/office/drawing/2014/main" id="{4DD28109-8A5A-E240-A3E0-20F982FC80EB}"/>
+              </a:ext>
+            </a:extLst>
+          </p:cNvPr>
+          <p:cNvSpPr/>
+          <p:nvPr/>
+        </p:nvSpPr>
+        <p:spPr>
+          <a:xfrm>
+            <a:off x="897630" y="2723114"/>
+            <a:ext cx="1224001" cy="196552"/>
+          </a:xfrm>
+          <a:prstGeom prst="rect">
+            <a:avLst/>
+          </a:prstGeom>
+          <a:noFill/>
+          <a:ln>
+            <a:noFill/>
+          </a:ln>
+        </p:spPr>
+        <p:style>
+          <a:lnRef idx="2">
+            <a:schemeClr val="accent1">
+              <a:shade val="50000"/>
+            </a:schemeClr>
+          </a:lnRef>
+          <a:fillRef idx="1">
+            <a:schemeClr val="accent1"/>
+          </a:fillRef>
+          <a:effectRef idx="0">
+            <a:schemeClr val="accent1"/>
+          </a:effectRef>
+          <a:fontRef idx="minor">
+            <a:schemeClr val="lt1"/>
+          </a:fontRef>
+        </p:style>
+        <p:txBody>
+          <a:bodyPr rtlCol="0" anchor="ctr"/>
+          <a:lstStyle/>
+          <a:p>
+            <a:pPr algn="ctr"/>
+            <a:r>
+              <a:rPr lang="en-US" sz="1200" dirty="0">
+                <a:solidFill>
+                  <a:schemeClr val="tx1"/>
+                </a:solidFill>
+              </a:rPr>
+              <a:t>Acetaldehyde</a:t>
+            </a:r>
+          </a:p>
+        </p:txBody>
+      </p:sp>
+      <p:sp>
+        <p:nvSpPr>
+          <p:cNvPr id="79" name="Rectangle 78">
+            <a:extLst>
+              <a:ext uri="{FF2B5EF4-FFF2-40B4-BE49-F238E27FC236}">
+                <a16:creationId xmlns:a16="http://schemas.microsoft.com/office/drawing/2014/main" id="{E125531A-1F01-7247-9978-8550BDC5FD4D}"/>
+              </a:ext>
+            </a:extLst>
+          </p:cNvPr>
+          <p:cNvSpPr/>
+          <p:nvPr/>
+        </p:nvSpPr>
+        <p:spPr>
+          <a:xfrm>
+            <a:off x="897629" y="3814156"/>
+            <a:ext cx="1224001" cy="196552"/>
+          </a:xfrm>
+          <a:prstGeom prst="rect">
+            <a:avLst/>
+          </a:prstGeom>
+          <a:noFill/>
+          <a:ln>
+            <a:noFill/>
+          </a:ln>
+        </p:spPr>
+        <p:style>
+          <a:lnRef idx="2">
+            <a:schemeClr val="accent1">
+              <a:shade val="50000"/>
+            </a:schemeClr>
+          </a:lnRef>
+          <a:fillRef idx="1">
+            <a:schemeClr val="accent1"/>
+          </a:fillRef>
+          <a:effectRef idx="0">
+            <a:schemeClr val="accent1"/>
+          </a:effectRef>
+          <a:fontRef idx="minor">
+            <a:schemeClr val="lt1"/>
+          </a:fontRef>
+        </p:style>
+        <p:txBody>
+          <a:bodyPr rtlCol="0" anchor="ctr"/>
+          <a:lstStyle/>
+          <a:p>
+            <a:pPr algn="ctr"/>
+            <a:r>
+              <a:rPr lang="en-US" sz="1200" dirty="0">
+                <a:solidFill>
+                  <a:schemeClr val="tx1"/>
+                </a:solidFill>
+              </a:rPr>
+              <a:t>Acetate</a:t>
+            </a:r>
+          </a:p>
+        </p:txBody>
+      </p:sp>
+      <p:sp>
+        <p:nvSpPr>
+          <p:cNvPr id="80" name="Rectangle 79">
+            <a:extLst>
+              <a:ext uri="{FF2B5EF4-FFF2-40B4-BE49-F238E27FC236}">
+                <a16:creationId xmlns:a16="http://schemas.microsoft.com/office/drawing/2014/main" id="{2AA02398-4909-C240-A02C-33AEC698F3D9}"/>
+              </a:ext>
+            </a:extLst>
+          </p:cNvPr>
+          <p:cNvSpPr/>
+          <p:nvPr/>
+        </p:nvSpPr>
+        <p:spPr>
+          <a:xfrm>
+            <a:off x="895419" y="4891080"/>
+            <a:ext cx="1224001" cy="196552"/>
+          </a:xfrm>
+          <a:prstGeom prst="rect">
+            <a:avLst/>
+          </a:prstGeom>
+          <a:noFill/>
+          <a:ln>
+            <a:noFill/>
+          </a:ln>
+        </p:spPr>
+        <p:style>
+          <a:lnRef idx="2">
+            <a:schemeClr val="accent1">
+              <a:shade val="50000"/>
+            </a:schemeClr>
+          </a:lnRef>
+          <a:fillRef idx="1">
+            <a:schemeClr val="accent1"/>
+          </a:fillRef>
+          <a:effectRef idx="0">
+            <a:schemeClr val="accent1"/>
+          </a:effectRef>
+          <a:fontRef idx="minor">
+            <a:schemeClr val="lt1"/>
+          </a:fontRef>
+        </p:style>
+        <p:txBody>
+          <a:bodyPr rtlCol="0" anchor="ctr"/>
+          <a:lstStyle/>
+          <a:p>
+            <a:pPr algn="ctr"/>
+            <a:r>
+              <a:rPr lang="en-US" sz="1200" dirty="0">
+                <a:solidFill>
+                  <a:schemeClr val="tx1"/>
+                </a:solidFill>
+              </a:rPr>
+              <a:t>Acetyl-CoA</a:t>
+            </a:r>
+          </a:p>
+        </p:txBody>
+      </p:sp>
+      <p:sp>
+        <p:nvSpPr>
+          <p:cNvPr id="81" name="Rectangle 80">
+            <a:extLst>
+              <a:ext uri="{FF2B5EF4-FFF2-40B4-BE49-F238E27FC236}">
+                <a16:creationId xmlns:a16="http://schemas.microsoft.com/office/drawing/2014/main" id="{A719D8E2-09DD-2242-9A61-80CF4DF0C5BD}"/>
+              </a:ext>
+            </a:extLst>
+          </p:cNvPr>
+          <p:cNvSpPr/>
+          <p:nvPr/>
+        </p:nvSpPr>
+        <p:spPr>
+          <a:xfrm>
+            <a:off x="897629" y="5425469"/>
+            <a:ext cx="1224001" cy="276999"/>
+          </a:xfrm>
+          <a:prstGeom prst="rect">
+            <a:avLst/>
+          </a:prstGeom>
+          <a:solidFill>
+            <a:schemeClr val="bg2"/>
+          </a:solidFill>
+          <a:ln>
+            <a:noFill/>
+          </a:ln>
+        </p:spPr>
+        <p:txBody>
+          <a:bodyPr wrap="square" rtlCol="0" anchor="ctr">
+            <a:spAutoFit/>
+          </a:bodyPr>
+          <a:lstStyle/>
+          <a:p>
+            <a:pPr algn="ctr"/>
+            <a:r>
+              <a:rPr lang="en-US" sz="1200" dirty="0">
+                <a:solidFill>
+                  <a:schemeClr val="bg2">
+                    <a:lumMod val="50000"/>
+                  </a:schemeClr>
+                </a:solidFill>
+              </a:rPr>
+              <a:t>TCA cycle</a:t>
+            </a:r>
+          </a:p>
+        </p:txBody>
+      </p:sp>
+      <p:pic>
+        <p:nvPicPr>
+          <p:cNvPr id="82" name="Picture 81">
+            <a:extLst>
+              <a:ext uri="{FF2B5EF4-FFF2-40B4-BE49-F238E27FC236}">
+                <a16:creationId xmlns:a16="http://schemas.microsoft.com/office/drawing/2014/main" id="{1CE61281-E3B7-0C40-A15A-FF136D5247F6}"/>
+              </a:ext>
+            </a:extLst>
+          </p:cNvPr>
+          <p:cNvPicPr>
+            <a:picLocks noChangeAspect="1"/>
+          </p:cNvPicPr>
+          <p:nvPr/>
+        </p:nvPicPr>
+        <p:blipFill>
+          <a:blip r:embed="rId3"/>
+          <a:stretch>
+            <a:fillRect/>
+          </a:stretch>
+        </p:blipFill>
+        <p:spPr>
+          <a:xfrm>
+            <a:off x="2815434" y="3771306"/>
+            <a:ext cx="531846" cy="196552"/>
+          </a:xfrm>
+          <a:prstGeom prst="rect">
+            <a:avLst/>
+          </a:prstGeom>
+        </p:spPr>
+      </p:pic>
+      <p:pic>
+        <p:nvPicPr>
+          <p:cNvPr id="83" name="Picture 82">
+            <a:extLst>
+              <a:ext uri="{FF2B5EF4-FFF2-40B4-BE49-F238E27FC236}">
+                <a16:creationId xmlns:a16="http://schemas.microsoft.com/office/drawing/2014/main" id="{41E617B2-208C-AD4B-836B-051606A9DC01}"/>
+              </a:ext>
+            </a:extLst>
+          </p:cNvPr>
+          <p:cNvPicPr>
+            <a:picLocks noChangeAspect="1"/>
+          </p:cNvPicPr>
+          <p:nvPr/>
+        </p:nvPicPr>
+        <p:blipFill>
+          <a:blip r:embed="rId4"/>
+          <a:stretch>
+            <a:fillRect/>
+          </a:stretch>
+        </p:blipFill>
+        <p:spPr>
+          <a:xfrm>
+            <a:off x="2749619" y="271309"/>
+            <a:ext cx="1355627" cy="297718"/>
+          </a:xfrm>
+          <a:prstGeom prst="rect">
+            <a:avLst/>
+          </a:prstGeom>
+        </p:spPr>
+      </p:pic>
+      <p:pic>
+        <p:nvPicPr>
+          <p:cNvPr id="84" name="Picture 83">
+            <a:extLst>
+              <a:ext uri="{FF2B5EF4-FFF2-40B4-BE49-F238E27FC236}">
+                <a16:creationId xmlns:a16="http://schemas.microsoft.com/office/drawing/2014/main" id="{A9FFE4F9-7021-0C46-9126-FFC998533FA5}"/>
+              </a:ext>
+            </a:extLst>
+          </p:cNvPr>
+          <p:cNvPicPr>
+            <a:picLocks noChangeAspect="1"/>
+          </p:cNvPicPr>
+          <p:nvPr/>
+        </p:nvPicPr>
+        <p:blipFill>
+          <a:blip r:embed="rId5"/>
+          <a:stretch>
+            <a:fillRect/>
+          </a:stretch>
+        </p:blipFill>
+        <p:spPr>
+          <a:xfrm>
+            <a:off x="2405337" y="1271017"/>
+            <a:ext cx="965413" cy="346855"/>
+          </a:xfrm>
+          <a:prstGeom prst="rect">
+            <a:avLst/>
+          </a:prstGeom>
+        </p:spPr>
+      </p:pic>
+      <p:pic>
+        <p:nvPicPr>
+          <p:cNvPr id="85" name="Picture 84">
+            <a:extLst>
+              <a:ext uri="{FF2B5EF4-FFF2-40B4-BE49-F238E27FC236}">
+                <a16:creationId xmlns:a16="http://schemas.microsoft.com/office/drawing/2014/main" id="{B302E138-5937-354F-99A1-4F8A88EADF9C}"/>
+              </a:ext>
+            </a:extLst>
+          </p:cNvPr>
+          <p:cNvPicPr>
+            <a:picLocks noChangeAspect="1"/>
+          </p:cNvPicPr>
+          <p:nvPr/>
+        </p:nvPicPr>
+        <p:blipFill>
+          <a:blip r:embed="rId6"/>
+          <a:stretch>
+            <a:fillRect/>
+          </a:stretch>
+        </p:blipFill>
+        <p:spPr>
+          <a:xfrm>
+            <a:off x="2622122" y="2467487"/>
+            <a:ext cx="748628" cy="271703"/>
+          </a:xfrm>
+          <a:prstGeom prst="rect">
+            <a:avLst/>
+          </a:prstGeom>
+        </p:spPr>
+      </p:pic>
+      <p:cxnSp>
+        <p:nvCxnSpPr>
+          <p:cNvPr id="86" name="Straight Arrow Connector 85">
+            <a:extLst>
+              <a:ext uri="{FF2B5EF4-FFF2-40B4-BE49-F238E27FC236}">
+                <a16:creationId xmlns:a16="http://schemas.microsoft.com/office/drawing/2014/main" id="{A33AC5E7-759C-4343-BB76-8F237D02994C}"/>
+              </a:ext>
+            </a:extLst>
+          </p:cNvPr>
+          <p:cNvCxnSpPr>
+            <a:cxnSpLocks/>
+            <a:stCxn id="73" idx="2"/>
+            <a:endCxn id="74" idx="0"/>
+          </p:cNvCxnSpPr>
+          <p:nvPr/>
+        </p:nvCxnSpPr>
+        <p:spPr>
+          <a:xfrm>
+            <a:off x="3429000" y="779648"/>
+            <a:ext cx="0" cy="846698"/>
+          </a:xfrm>
+          <a:prstGeom prst="straightConnector1">
+            <a:avLst/>
+          </a:prstGeom>
+          <a:ln w="28575">
+            <a:solidFill>
+              <a:schemeClr val="tx1"/>
+            </a:solidFill>
+            <a:tailEnd type="triangle"/>
+          </a:ln>
+        </p:spPr>
+        <p:style>
+          <a:lnRef idx="1">
+            <a:schemeClr val="accent1"/>
+          </a:lnRef>
+          <a:fillRef idx="0">
+            <a:schemeClr val="accent1"/>
+          </a:fillRef>
+          <a:effectRef idx="0">
+            <a:schemeClr val="accent1"/>
+          </a:effectRef>
+          <a:fontRef idx="minor">
+            <a:schemeClr val="tx1"/>
+          </a:fontRef>
+        </p:style>
+      </p:cxnSp>
+      <p:grpSp>
+        <p:nvGrpSpPr>
+          <p:cNvPr id="99" name="Group 98">
+            <a:extLst>
+              <a:ext uri="{FF2B5EF4-FFF2-40B4-BE49-F238E27FC236}">
+                <a16:creationId xmlns:a16="http://schemas.microsoft.com/office/drawing/2014/main" id="{2BA1630E-A46B-8C47-8E7D-75444B0FB8D0}"/>
+              </a:ext>
+            </a:extLst>
+          </p:cNvPr>
+          <p:cNvGrpSpPr/>
+          <p:nvPr/>
+        </p:nvGrpSpPr>
+        <p:grpSpPr>
+          <a:xfrm>
+            <a:off x="3427433" y="1822898"/>
+            <a:ext cx="189570" cy="1077071"/>
+            <a:chOff x="3427433" y="1822898"/>
+            <a:chExt cx="189570" cy="1077071"/>
+          </a:xfrm>
+        </p:grpSpPr>
+        <p:cxnSp>
+          <p:nvCxnSpPr>
+            <p:cNvPr id="87" name="Straight Arrow Connector 86">
+              <a:extLst>
+                <a:ext uri="{FF2B5EF4-FFF2-40B4-BE49-F238E27FC236}">
+                  <a16:creationId xmlns:a16="http://schemas.microsoft.com/office/drawing/2014/main" id="{46523230-38F2-FE46-AC52-78865D3A007B}"/>
+                </a:ext>
+              </a:extLst>
+            </p:cNvPr>
+            <p:cNvCxnSpPr>
+              <a:cxnSpLocks/>
+              <a:stCxn id="74" idx="2"/>
+              <a:endCxn id="75" idx="0"/>
+            </p:cNvCxnSpPr>
+            <p:nvPr/>
+          </p:nvCxnSpPr>
+          <p:spPr>
+            <a:xfrm>
+              <a:off x="3429000" y="1822898"/>
+              <a:ext cx="0" cy="865948"/>
+            </a:xfrm>
+            <a:prstGeom prst="straightConnector1">
+              <a:avLst/>
+            </a:prstGeom>
+            <a:ln w="28575">
+              <a:solidFill>
+                <a:schemeClr val="tx1"/>
+              </a:solidFill>
+              <a:prstDash val="dash"/>
+              <a:tailEnd type="triangle"/>
+            </a:ln>
+          </p:spPr>
+          <p:style>
+            <a:lnRef idx="1">
+              <a:schemeClr val="accent1"/>
+            </a:lnRef>
+            <a:fillRef idx="0">
+              <a:schemeClr val="accent1"/>
+            </a:fillRef>
+            <a:effectRef idx="0">
+              <a:schemeClr val="accent1"/>
+            </a:effectRef>
+            <a:fontRef idx="minor">
+              <a:schemeClr val="tx1"/>
+            </a:fontRef>
+          </p:style>
+        </p:cxnSp>
+        <p:sp>
+          <p:nvSpPr>
+            <p:cNvPr id="33" name="Rectangle 32">
+              <a:extLst>
+                <a:ext uri="{FF2B5EF4-FFF2-40B4-BE49-F238E27FC236}">
+                  <a16:creationId xmlns:a16="http://schemas.microsoft.com/office/drawing/2014/main" id="{2C69DC6C-E5B1-F34D-AE74-1EC32C8DA0E4}"/>
+                </a:ext>
+              </a:extLst>
+            </p:cNvPr>
+            <p:cNvSpPr/>
+            <p:nvPr/>
+          </p:nvSpPr>
+          <p:spPr>
+            <a:xfrm>
+              <a:off x="3427433" y="2538195"/>
+              <a:ext cx="189570" cy="361774"/>
+            </a:xfrm>
+            <a:prstGeom prst="rect">
+              <a:avLst/>
+            </a:prstGeom>
+            <a:noFill/>
+            <a:ln>
+              <a:noFill/>
+            </a:ln>
+          </p:spPr>
+          <p:style>
+            <a:lnRef idx="2">
+              <a:schemeClr val="accent1">
+                <a:shade val="50000"/>
+              </a:schemeClr>
+            </a:lnRef>
+            <a:fillRef idx="1">
+              <a:schemeClr val="accent1"/>
+            </a:fillRef>
+            <a:effectRef idx="0">
+              <a:schemeClr val="accent1"/>
+            </a:effectRef>
+            <a:fontRef idx="minor">
+              <a:schemeClr val="lt1"/>
+            </a:fontRef>
+          </p:style>
+          <p:txBody>
+            <a:bodyPr rtlCol="0" anchor="ctr"/>
+            <a:lstStyle/>
+            <a:p>
+              <a:pPr algn="ctr"/>
+              <a:endParaRPr lang="en-US"/>
+            </a:p>
+          </p:txBody>
+        </p:sp>
+      </p:grpSp>
+      <p:grpSp>
+        <p:nvGrpSpPr>
+          <p:cNvPr id="100" name="Group 99">
+            <a:extLst>
+              <a:ext uri="{FF2B5EF4-FFF2-40B4-BE49-F238E27FC236}">
+                <a16:creationId xmlns:a16="http://schemas.microsoft.com/office/drawing/2014/main" id="{F1395A4E-C271-924F-AE64-D6FC05C65258}"/>
+              </a:ext>
+            </a:extLst>
+          </p:cNvPr>
+          <p:cNvGrpSpPr/>
+          <p:nvPr/>
+        </p:nvGrpSpPr>
+        <p:grpSpPr>
+          <a:xfrm>
+            <a:off x="3427433" y="2885398"/>
+            <a:ext cx="189570" cy="1387044"/>
+            <a:chOff x="3427433" y="2885398"/>
+            <a:chExt cx="189570" cy="1387044"/>
+          </a:xfrm>
+        </p:grpSpPr>
+        <p:cxnSp>
+          <p:nvCxnSpPr>
+            <p:cNvPr id="88" name="Straight Arrow Connector 87">
+              <a:extLst>
+                <a:ext uri="{FF2B5EF4-FFF2-40B4-BE49-F238E27FC236}">
+                  <a16:creationId xmlns:a16="http://schemas.microsoft.com/office/drawing/2014/main" id="{018362A7-80B5-B743-A400-2373671C7093}"/>
+                </a:ext>
+              </a:extLst>
+            </p:cNvPr>
+            <p:cNvCxnSpPr>
+              <a:cxnSpLocks/>
+              <a:stCxn id="75" idx="2"/>
+              <a:endCxn id="76" idx="0"/>
+            </p:cNvCxnSpPr>
+            <p:nvPr/>
+          </p:nvCxnSpPr>
+          <p:spPr>
+            <a:xfrm>
+              <a:off x="3429000" y="2885398"/>
+              <a:ext cx="0" cy="1135448"/>
+            </a:xfrm>
+            <a:prstGeom prst="straightConnector1">
+              <a:avLst/>
+            </a:prstGeom>
+            <a:ln w="28575">
+              <a:solidFill>
+                <a:schemeClr val="tx1"/>
+              </a:solidFill>
+              <a:tailEnd type="triangle"/>
+            </a:ln>
+          </p:spPr>
+          <p:style>
+            <a:lnRef idx="1">
+              <a:schemeClr val="accent1"/>
+            </a:lnRef>
+            <a:fillRef idx="0">
+              <a:schemeClr val="accent1"/>
+            </a:fillRef>
+            <a:effectRef idx="0">
+              <a:schemeClr val="accent1"/>
+            </a:effectRef>
+            <a:fontRef idx="minor">
+              <a:schemeClr val="tx1"/>
+            </a:fontRef>
+          </p:style>
+        </p:cxnSp>
+        <p:sp>
+          <p:nvSpPr>
+            <p:cNvPr id="94" name="Rectangle 93">
+              <a:extLst>
+                <a:ext uri="{FF2B5EF4-FFF2-40B4-BE49-F238E27FC236}">
+                  <a16:creationId xmlns:a16="http://schemas.microsoft.com/office/drawing/2014/main" id="{75A0E13F-E487-0543-AF2F-6A842B1F1B69}"/>
+                </a:ext>
+              </a:extLst>
+            </p:cNvPr>
+            <p:cNvSpPr/>
+            <p:nvPr/>
+          </p:nvSpPr>
+          <p:spPr>
+            <a:xfrm>
+              <a:off x="3427433" y="3910668"/>
+              <a:ext cx="189570" cy="361774"/>
+            </a:xfrm>
+            <a:prstGeom prst="rect">
+              <a:avLst/>
+            </a:prstGeom>
+            <a:noFill/>
+            <a:ln>
+              <a:noFill/>
+            </a:ln>
+          </p:spPr>
+          <p:style>
+            <a:lnRef idx="2">
+              <a:schemeClr val="accent1">
+                <a:shade val="50000"/>
+              </a:schemeClr>
+            </a:lnRef>
+            <a:fillRef idx="1">
+              <a:schemeClr val="accent1"/>
+            </a:fillRef>
+            <a:effectRef idx="0">
+              <a:schemeClr val="accent1"/>
+            </a:effectRef>
+            <a:fontRef idx="minor">
+              <a:schemeClr val="lt1"/>
+            </a:fontRef>
+          </p:style>
+          <p:txBody>
+            <a:bodyPr rtlCol="0" anchor="ctr"/>
+            <a:lstStyle/>
+            <a:p>
+              <a:pPr algn="ctr"/>
+              <a:endParaRPr lang="en-US"/>
+            </a:p>
+          </p:txBody>
+        </p:sp>
+      </p:grpSp>
+      <p:cxnSp>
+        <p:nvCxnSpPr>
+          <p:cNvPr id="37" name="Curved Connector 36">
+            <a:extLst>
+              <a:ext uri="{FF2B5EF4-FFF2-40B4-BE49-F238E27FC236}">
+                <a16:creationId xmlns:a16="http://schemas.microsoft.com/office/drawing/2014/main" id="{CE603287-7078-164D-954A-9DF13089C884}"/>
+              </a:ext>
+            </a:extLst>
+          </p:cNvPr>
+          <p:cNvCxnSpPr>
+            <a:cxnSpLocks/>
+            <a:endCxn id="77" idx="3"/>
+          </p:cNvCxnSpPr>
+          <p:nvPr/>
+        </p:nvCxnSpPr>
+        <p:spPr>
+          <a:xfrm rot="10800000">
+            <a:off x="1869631" y="1730023"/>
+            <a:ext cx="1537013" cy="620249"/>
+          </a:xfrm>
+          <a:prstGeom prst="curvedConnector3">
+            <a:avLst>
+              <a:gd name="adj1" fmla="val 53757"/>
+            </a:avLst>
+          </a:prstGeom>
+          <a:ln w="28575">
+            <a:solidFill>
+              <a:schemeClr val="tx1"/>
+            </a:solidFill>
+            <a:prstDash val="dash"/>
+            <a:tailEnd type="triangle"/>
+          </a:ln>
+        </p:spPr>
+        <p:style>
+          <a:lnRef idx="1">
+            <a:schemeClr val="accent1"/>
+          </a:lnRef>
+          <a:fillRef idx="0">
+            <a:schemeClr val="accent1"/>
+          </a:fillRef>
+          <a:effectRef idx="0">
+            <a:schemeClr val="accent1"/>
+          </a:effectRef>
+          <a:fontRef idx="minor">
+            <a:schemeClr val="tx1"/>
+          </a:fontRef>
+        </p:style>
+      </p:cxnSp>
+      <p:cxnSp>
+        <p:nvCxnSpPr>
+          <p:cNvPr id="101" name="Straight Arrow Connector 100">
+            <a:extLst>
+              <a:ext uri="{FF2B5EF4-FFF2-40B4-BE49-F238E27FC236}">
+                <a16:creationId xmlns:a16="http://schemas.microsoft.com/office/drawing/2014/main" id="{6927CB09-2B62-2A40-98A7-C6B16F06931F}"/>
+              </a:ext>
+            </a:extLst>
+          </p:cNvPr>
+          <p:cNvCxnSpPr>
+            <a:cxnSpLocks/>
+            <a:stCxn id="77" idx="2"/>
+            <a:endCxn id="78" idx="0"/>
+          </p:cNvCxnSpPr>
+          <p:nvPr/>
+        </p:nvCxnSpPr>
+        <p:spPr>
+          <a:xfrm>
+            <a:off x="1509630" y="1828298"/>
+            <a:ext cx="1" cy="894816"/>
+          </a:xfrm>
+          <a:prstGeom prst="straightConnector1">
+            <a:avLst/>
+          </a:prstGeom>
+          <a:ln w="28575">
+            <a:solidFill>
+              <a:schemeClr val="tx1"/>
+            </a:solidFill>
+            <a:tailEnd type="triangle"/>
+          </a:ln>
+        </p:spPr>
+        <p:style>
+          <a:lnRef idx="1">
+            <a:schemeClr val="accent1"/>
+          </a:lnRef>
+          <a:fillRef idx="0">
+            <a:schemeClr val="accent1"/>
+          </a:fillRef>
+          <a:effectRef idx="0">
+            <a:schemeClr val="accent1"/>
+          </a:effectRef>
+          <a:fontRef idx="minor">
+            <a:schemeClr val="tx1"/>
+          </a:fontRef>
+        </p:style>
+      </p:cxnSp>
+      <p:cxnSp>
+        <p:nvCxnSpPr>
+          <p:cNvPr id="104" name="Straight Arrow Connector 103">
+            <a:extLst>
+              <a:ext uri="{FF2B5EF4-FFF2-40B4-BE49-F238E27FC236}">
+                <a16:creationId xmlns:a16="http://schemas.microsoft.com/office/drawing/2014/main" id="{D6969F14-A26D-4745-9897-35BCC8EEBED3}"/>
+              </a:ext>
+            </a:extLst>
+          </p:cNvPr>
+          <p:cNvCxnSpPr>
+            <a:cxnSpLocks/>
+            <a:stCxn id="78" idx="2"/>
+            <a:endCxn id="79" idx="0"/>
+          </p:cNvCxnSpPr>
+          <p:nvPr/>
+        </p:nvCxnSpPr>
+        <p:spPr>
+          <a:xfrm flipH="1">
+            <a:off x="1509630" y="2919666"/>
+            <a:ext cx="1" cy="894490"/>
+          </a:xfrm>
+          <a:prstGeom prst="straightConnector1">
+            <a:avLst/>
+          </a:prstGeom>
+          <a:ln w="28575">
+            <a:solidFill>
+              <a:schemeClr val="tx1"/>
+            </a:solidFill>
+            <a:tailEnd type="triangle"/>
+          </a:ln>
+        </p:spPr>
+        <p:style>
+          <a:lnRef idx="1">
+            <a:schemeClr val="accent1"/>
+          </a:lnRef>
+          <a:fillRef idx="0">
+            <a:schemeClr val="accent1"/>
+          </a:fillRef>
+          <a:effectRef idx="0">
+            <a:schemeClr val="accent1"/>
+          </a:effectRef>
+          <a:fontRef idx="minor">
+            <a:schemeClr val="tx1"/>
+          </a:fontRef>
+        </p:style>
+      </p:cxnSp>
+      <p:cxnSp>
+        <p:nvCxnSpPr>
+          <p:cNvPr id="107" name="Straight Arrow Connector 106">
+            <a:extLst>
+              <a:ext uri="{FF2B5EF4-FFF2-40B4-BE49-F238E27FC236}">
+                <a16:creationId xmlns:a16="http://schemas.microsoft.com/office/drawing/2014/main" id="{DFFF00A5-BEDE-7640-BF9A-DEDE3905DA3E}"/>
+              </a:ext>
+            </a:extLst>
+          </p:cNvPr>
+          <p:cNvCxnSpPr>
+            <a:cxnSpLocks/>
+            <a:stCxn id="79" idx="2"/>
+          </p:cNvCxnSpPr>
+          <p:nvPr/>
+        </p:nvCxnSpPr>
+        <p:spPr>
+          <a:xfrm>
+            <a:off x="1509630" y="4010708"/>
+            <a:ext cx="0" cy="890826"/>
+          </a:xfrm>
+          <a:prstGeom prst="straightConnector1">
+            <a:avLst/>
+          </a:prstGeom>
+          <a:ln w="28575">
+            <a:solidFill>
+              <a:schemeClr val="tx1"/>
+            </a:solidFill>
+            <a:tailEnd type="triangle"/>
+          </a:ln>
+        </p:spPr>
+        <p:style>
+          <a:lnRef idx="1">
+            <a:schemeClr val="accent1"/>
+          </a:lnRef>
+          <a:fillRef idx="0">
+            <a:schemeClr val="accent1"/>
+          </a:fillRef>
+          <a:effectRef idx="0">
+            <a:schemeClr val="accent1"/>
+          </a:effectRef>
+          <a:fontRef idx="minor">
+            <a:schemeClr val="tx1"/>
+          </a:fontRef>
+        </p:style>
+      </p:cxnSp>
+      <p:cxnSp>
+        <p:nvCxnSpPr>
+          <p:cNvPr id="110" name="Straight Arrow Connector 109">
+            <a:extLst>
+              <a:ext uri="{FF2B5EF4-FFF2-40B4-BE49-F238E27FC236}">
+                <a16:creationId xmlns:a16="http://schemas.microsoft.com/office/drawing/2014/main" id="{61891AD0-688F-BA49-A163-621AD3126A77}"/>
+              </a:ext>
+            </a:extLst>
+          </p:cNvPr>
+          <p:cNvCxnSpPr>
+            <a:cxnSpLocks/>
+            <a:stCxn id="80" idx="2"/>
+            <a:endCxn id="81" idx="0"/>
+          </p:cNvCxnSpPr>
+          <p:nvPr/>
+        </p:nvCxnSpPr>
+        <p:spPr>
+          <a:xfrm>
+            <a:off x="1507420" y="5087632"/>
+            <a:ext cx="2210" cy="337837"/>
+          </a:xfrm>
+          <a:prstGeom prst="straightConnector1">
+            <a:avLst/>
+          </a:prstGeom>
+          <a:ln w="28575">
+            <a:solidFill>
+              <a:schemeClr val="tx1"/>
+            </a:solidFill>
+            <a:tailEnd type="triangle"/>
+          </a:ln>
+        </p:spPr>
+        <p:style>
+          <a:lnRef idx="1">
+            <a:schemeClr val="accent1"/>
+          </a:lnRef>
+          <a:fillRef idx="0">
+            <a:schemeClr val="accent1"/>
+          </a:fillRef>
+          <a:effectRef idx="0">
+            <a:schemeClr val="accent1"/>
+          </a:effectRef>
+          <a:fontRef idx="minor">
+            <a:schemeClr val="tx1"/>
+          </a:fontRef>
+        </p:style>
+      </p:cxnSp>
+      <p:pic>
+        <p:nvPicPr>
+          <p:cNvPr id="131" name="Picture 130">
+            <a:extLst>
+              <a:ext uri="{FF2B5EF4-FFF2-40B4-BE49-F238E27FC236}">
+                <a16:creationId xmlns:a16="http://schemas.microsoft.com/office/drawing/2014/main" id="{CD96A6D1-F7A5-AE42-A963-45D46BD6B656}"/>
+              </a:ext>
+            </a:extLst>
+          </p:cNvPr>
+          <p:cNvPicPr>
+            <a:picLocks noChangeAspect="1"/>
+          </p:cNvPicPr>
+          <p:nvPr/>
+        </p:nvPicPr>
+        <p:blipFill rotWithShape="1">
+          <a:blip r:embed="rId7"/>
+          <a:srcRect l="39531" t="12773" r="49146" b="81740"/>
+          <a:stretch/>
+        </p:blipFill>
+        <p:spPr>
+          <a:xfrm>
+            <a:off x="1018205" y="2484689"/>
+            <a:ext cx="390762" cy="267989"/>
+          </a:xfrm>
+          <a:prstGeom prst="rect">
+            <a:avLst/>
+          </a:prstGeom>
+        </p:spPr>
+      </p:pic>
+      <p:pic>
+        <p:nvPicPr>
+          <p:cNvPr id="132" name="Picture 131">
+            <a:extLst>
+              <a:ext uri="{FF2B5EF4-FFF2-40B4-BE49-F238E27FC236}">
+                <a16:creationId xmlns:a16="http://schemas.microsoft.com/office/drawing/2014/main" id="{F5825AEA-6ACF-7B4C-B85A-05FD4CAD9944}"/>
+              </a:ext>
+            </a:extLst>
+          </p:cNvPr>
+          <p:cNvPicPr>
+            <a:picLocks noChangeAspect="1"/>
+          </p:cNvPicPr>
+          <p:nvPr/>
+        </p:nvPicPr>
+        <p:blipFill rotWithShape="1">
+          <a:blip r:embed="rId8"/>
+          <a:srcRect l="39601" t="12967" r="47412" b="78803"/>
+          <a:stretch/>
+        </p:blipFill>
+        <p:spPr>
+          <a:xfrm>
+            <a:off x="1000846" y="3450405"/>
+            <a:ext cx="405568" cy="363751"/>
+          </a:xfrm>
+          <a:prstGeom prst="rect">
+            <a:avLst/>
+          </a:prstGeom>
+        </p:spPr>
+      </p:pic>
+      <p:pic>
+        <p:nvPicPr>
+          <p:cNvPr id="133" name="Picture 132">
+            <a:extLst>
+              <a:ext uri="{FF2B5EF4-FFF2-40B4-BE49-F238E27FC236}">
+                <a16:creationId xmlns:a16="http://schemas.microsoft.com/office/drawing/2014/main" id="{E0930689-CEA2-DA40-95EB-D2168DACB759}"/>
+              </a:ext>
+            </a:extLst>
+          </p:cNvPr>
+          <p:cNvPicPr>
+            <a:picLocks noChangeAspect="1"/>
+          </p:cNvPicPr>
+          <p:nvPr/>
+        </p:nvPicPr>
+        <p:blipFill rotWithShape="1">
+          <a:blip r:embed="rId9"/>
+          <a:srcRect l="39602" t="12661" r="45142" b="79096"/>
+          <a:stretch/>
+        </p:blipFill>
+        <p:spPr>
+          <a:xfrm>
+            <a:off x="966920" y="4502192"/>
+            <a:ext cx="463668" cy="354529"/>
+          </a:xfrm>
+          <a:prstGeom prst="rect">
+            <a:avLst/>
+          </a:prstGeom>
+        </p:spPr>
+      </p:pic>
+      <p:sp>
+        <p:nvSpPr>
+          <p:cNvPr id="139" name="TextBox 138">
+            <a:extLst>
+              <a:ext uri="{FF2B5EF4-FFF2-40B4-BE49-F238E27FC236}">
+                <a16:creationId xmlns:a16="http://schemas.microsoft.com/office/drawing/2014/main" id="{DC7D8D87-DE7B-C047-B2FF-79DC92D4D4D7}"/>
+              </a:ext>
+            </a:extLst>
+          </p:cNvPr>
+          <p:cNvSpPr txBox="1"/>
+          <p:nvPr/>
+        </p:nvSpPr>
+        <p:spPr>
+          <a:xfrm>
+            <a:off x="2795945" y="6646797"/>
+            <a:ext cx="1266704" cy="276999"/>
+          </a:xfrm>
+          <a:prstGeom prst="rect">
+            <a:avLst/>
+          </a:prstGeom>
+          <a:noFill/>
+        </p:spPr>
+        <p:txBody>
+          <a:bodyPr wrap="square" rtlCol="0">
+            <a:spAutoFit/>
+          </a:bodyPr>
+          <a:lstStyle/>
+          <a:p>
+            <a:pPr algn="ctr"/>
+            <a:r>
+              <a:rPr lang="en-US" sz="1200" dirty="0"/>
+              <a:t>Protocatechuate</a:t>
+            </a:r>
+          </a:p>
+        </p:txBody>
+      </p:sp>
+      <p:cxnSp>
+        <p:nvCxnSpPr>
+          <p:cNvPr id="141" name="Straight Arrow Connector 140">
+            <a:extLst>
+              <a:ext uri="{FF2B5EF4-FFF2-40B4-BE49-F238E27FC236}">
+                <a16:creationId xmlns:a16="http://schemas.microsoft.com/office/drawing/2014/main" id="{35B2F6CC-F1DD-E24B-B8D4-7B9ACA11284C}"/>
+              </a:ext>
+            </a:extLst>
+          </p:cNvPr>
+          <p:cNvCxnSpPr>
+            <a:cxnSpLocks/>
+            <a:stCxn id="76" idx="2"/>
+            <a:endCxn id="174" idx="0"/>
+          </p:cNvCxnSpPr>
+          <p:nvPr/>
+        </p:nvCxnSpPr>
+        <p:spPr>
+          <a:xfrm flipH="1">
+            <a:off x="3426913" y="4217398"/>
+            <a:ext cx="2087" cy="1178659"/>
+          </a:xfrm>
+          <a:prstGeom prst="straightConnector1">
+            <a:avLst/>
+          </a:prstGeom>
+          <a:ln w="28575">
+            <a:solidFill>
+              <a:schemeClr val="tx1"/>
+            </a:solidFill>
+            <a:tailEnd type="triangle"/>
+          </a:ln>
+        </p:spPr>
+        <p:style>
+          <a:lnRef idx="1">
+            <a:schemeClr val="accent1"/>
+          </a:lnRef>
+          <a:fillRef idx="0">
+            <a:schemeClr val="accent1"/>
+          </a:fillRef>
+          <a:effectRef idx="0">
+            <a:schemeClr val="accent1"/>
+          </a:effectRef>
+          <a:fontRef idx="minor">
+            <a:schemeClr val="tx1"/>
+          </a:fontRef>
+        </p:style>
+      </p:cxnSp>
+      <p:cxnSp>
+        <p:nvCxnSpPr>
+          <p:cNvPr id="148" name="Straight Arrow Connector 147">
+            <a:extLst>
+              <a:ext uri="{FF2B5EF4-FFF2-40B4-BE49-F238E27FC236}">
+                <a16:creationId xmlns:a16="http://schemas.microsoft.com/office/drawing/2014/main" id="{D27805A5-321C-524E-BC53-2376A652CDCA}"/>
+              </a:ext>
+            </a:extLst>
+          </p:cNvPr>
+          <p:cNvCxnSpPr>
+            <a:cxnSpLocks/>
+            <a:stCxn id="139" idx="2"/>
+            <a:endCxn id="151" idx="0"/>
+          </p:cNvCxnSpPr>
+          <p:nvPr/>
+        </p:nvCxnSpPr>
+        <p:spPr>
+          <a:xfrm>
+            <a:off x="3429297" y="6923796"/>
+            <a:ext cx="1085" cy="787259"/>
+          </a:xfrm>
+          <a:prstGeom prst="straightConnector1">
+            <a:avLst/>
+          </a:prstGeom>
+          <a:ln w="28575">
+            <a:solidFill>
+              <a:schemeClr val="tx1"/>
+            </a:solidFill>
+            <a:tailEnd type="triangle"/>
+          </a:ln>
+        </p:spPr>
+        <p:style>
+          <a:lnRef idx="1">
+            <a:schemeClr val="accent1"/>
+          </a:lnRef>
+          <a:fillRef idx="0">
+            <a:schemeClr val="accent1"/>
+          </a:fillRef>
+          <a:effectRef idx="0">
+            <a:schemeClr val="accent1"/>
+          </a:effectRef>
+          <a:fontRef idx="minor">
+            <a:schemeClr val="tx1"/>
+          </a:fontRef>
+        </p:style>
+      </p:cxnSp>
+      <p:sp>
+        <p:nvSpPr>
+          <p:cNvPr id="151" name="Rectangle 150">
+            <a:extLst>
+              <a:ext uri="{FF2B5EF4-FFF2-40B4-BE49-F238E27FC236}">
+                <a16:creationId xmlns:a16="http://schemas.microsoft.com/office/drawing/2014/main" id="{4A6179E3-7C1E-E444-928D-23FCF3E30289}"/>
+              </a:ext>
+            </a:extLst>
+          </p:cNvPr>
+          <p:cNvSpPr/>
+          <p:nvPr/>
+        </p:nvSpPr>
+        <p:spPr>
+          <a:xfrm>
+            <a:off x="2595032" y="7711055"/>
+            <a:ext cx="1670699" cy="276999"/>
+          </a:xfrm>
+          <a:prstGeom prst="rect">
+            <a:avLst/>
+          </a:prstGeom>
+          <a:noFill/>
+        </p:spPr>
+        <p:txBody>
+          <a:bodyPr wrap="square" rtlCol="0">
+            <a:spAutoFit/>
+          </a:bodyPr>
+          <a:lstStyle/>
+          <a:p>
+            <a:pPr algn="ctr"/>
+            <a:r>
+              <a:rPr lang="en-US" sz="1200" dirty="0"/>
+              <a:t>𝛃 -carboxy muconate</a:t>
+            </a:r>
+          </a:p>
+        </p:txBody>
+      </p:sp>
+      <p:pic>
+        <p:nvPicPr>
+          <p:cNvPr id="153" name="Picture 152">
+            <a:extLst>
+              <a:ext uri="{FF2B5EF4-FFF2-40B4-BE49-F238E27FC236}">
+                <a16:creationId xmlns:a16="http://schemas.microsoft.com/office/drawing/2014/main" id="{AB542A52-08FB-8940-9108-4B7A7D0A0C69}"/>
+              </a:ext>
+            </a:extLst>
+          </p:cNvPr>
+          <p:cNvPicPr>
+            <a:picLocks noChangeAspect="1"/>
+          </p:cNvPicPr>
+          <p:nvPr/>
+        </p:nvPicPr>
+        <p:blipFill rotWithShape="1">
+          <a:blip r:embed="rId10"/>
+          <a:srcRect l="30910" t="10956" r="52121" b="72127"/>
+          <a:stretch/>
+        </p:blipFill>
+        <p:spPr>
+          <a:xfrm>
+            <a:off x="2866237" y="6157550"/>
+            <a:ext cx="375131" cy="529200"/>
+          </a:xfrm>
+          <a:prstGeom prst="rect">
+            <a:avLst/>
+          </a:prstGeom>
+        </p:spPr>
+      </p:pic>
+      <p:pic>
+        <p:nvPicPr>
+          <p:cNvPr id="130" name="Picture 129">
+            <a:extLst>
+              <a:ext uri="{FF2B5EF4-FFF2-40B4-BE49-F238E27FC236}">
+                <a16:creationId xmlns:a16="http://schemas.microsoft.com/office/drawing/2014/main" id="{F97420E9-4504-2F4A-8A80-4509FCC3EB27}"/>
+              </a:ext>
+            </a:extLst>
+          </p:cNvPr>
+          <p:cNvPicPr>
+            <a:picLocks noChangeAspect="1"/>
+          </p:cNvPicPr>
+          <p:nvPr/>
+        </p:nvPicPr>
+        <p:blipFill rotWithShape="1">
+          <a:blip r:embed="rId11"/>
+          <a:srcRect l="37668" t="11867" r="47270" b="78624"/>
+          <a:stretch/>
+        </p:blipFill>
+        <p:spPr>
+          <a:xfrm>
+            <a:off x="1293607" y="1271017"/>
+            <a:ext cx="432043" cy="385990"/>
+          </a:xfrm>
+          <a:prstGeom prst="rect">
+            <a:avLst/>
+          </a:prstGeom>
+        </p:spPr>
+      </p:pic>
+      <p:sp>
+        <p:nvSpPr>
+          <p:cNvPr id="170" name="Rectangle 169">
+            <a:extLst>
+              <a:ext uri="{FF2B5EF4-FFF2-40B4-BE49-F238E27FC236}">
+                <a16:creationId xmlns:a16="http://schemas.microsoft.com/office/drawing/2014/main" id="{1B4AA615-D758-C547-B0EA-3DC3ACCBCFBE}"/>
+              </a:ext>
+            </a:extLst>
+          </p:cNvPr>
+          <p:cNvSpPr/>
+          <p:nvPr/>
+        </p:nvSpPr>
+        <p:spPr>
+          <a:xfrm>
+            <a:off x="2795945" y="8323661"/>
+            <a:ext cx="1266704" cy="461665"/>
+          </a:xfrm>
+          <a:prstGeom prst="rect">
+            <a:avLst/>
+          </a:prstGeom>
+          <a:solidFill>
+            <a:schemeClr val="bg2"/>
+          </a:solidFill>
+          <a:ln>
+            <a:noFill/>
+          </a:ln>
+        </p:spPr>
+        <p:txBody>
+          <a:bodyPr wrap="square" rtlCol="0">
+            <a:spAutoFit/>
+          </a:bodyPr>
+          <a:lstStyle/>
+          <a:p>
+            <a:pPr algn="ctr"/>
+            <a:r>
+              <a:rPr lang="en-US" sz="1200" dirty="0">
+                <a:solidFill>
+                  <a:schemeClr val="bg2">
+                    <a:lumMod val="50000"/>
+                  </a:schemeClr>
+                </a:solidFill>
+              </a:rPr>
+              <a:t>𝛃 -ketoadipate pathway</a:t>
+            </a:r>
+          </a:p>
+        </p:txBody>
+      </p:sp>
+      <p:cxnSp>
+        <p:nvCxnSpPr>
+          <p:cNvPr id="171" name="Straight Arrow Connector 170">
+            <a:extLst>
+              <a:ext uri="{FF2B5EF4-FFF2-40B4-BE49-F238E27FC236}">
+                <a16:creationId xmlns:a16="http://schemas.microsoft.com/office/drawing/2014/main" id="{F86D2F52-CAB5-6F4C-97E7-709E20727B82}"/>
+              </a:ext>
+            </a:extLst>
+          </p:cNvPr>
+          <p:cNvCxnSpPr>
+            <a:cxnSpLocks/>
+            <a:stCxn id="151" idx="2"/>
+            <a:endCxn id="170" idx="0"/>
+          </p:cNvCxnSpPr>
+          <p:nvPr/>
+        </p:nvCxnSpPr>
+        <p:spPr>
+          <a:xfrm flipH="1">
+            <a:off x="3429297" y="7988054"/>
+            <a:ext cx="1085" cy="335607"/>
+          </a:xfrm>
+          <a:prstGeom prst="straightConnector1">
+            <a:avLst/>
+          </a:prstGeom>
+          <a:ln w="28575">
+            <a:solidFill>
+              <a:schemeClr val="tx1"/>
+            </a:solidFill>
+            <a:tailEnd type="triangle"/>
+          </a:ln>
+        </p:spPr>
+        <p:style>
+          <a:lnRef idx="1">
+            <a:schemeClr val="accent1"/>
+          </a:lnRef>
+          <a:fillRef idx="0">
+            <a:schemeClr val="accent1"/>
+          </a:fillRef>
+          <a:effectRef idx="0">
+            <a:schemeClr val="accent1"/>
+          </a:effectRef>
+          <a:fontRef idx="minor">
+            <a:schemeClr val="tx1"/>
+          </a:fontRef>
+        </p:style>
+      </p:cxnSp>
+      <p:sp>
+        <p:nvSpPr>
+          <p:cNvPr id="174" name="TextBox 173">
+            <a:extLst>
+              <a:ext uri="{FF2B5EF4-FFF2-40B4-BE49-F238E27FC236}">
+                <a16:creationId xmlns:a16="http://schemas.microsoft.com/office/drawing/2014/main" id="{B6D5B26F-C641-054D-B724-AE92C041ADD8}"/>
+              </a:ext>
+            </a:extLst>
+          </p:cNvPr>
+          <p:cNvSpPr txBox="1"/>
+          <p:nvPr/>
+        </p:nvSpPr>
+        <p:spPr>
+          <a:xfrm>
+            <a:off x="2500106" y="5396057"/>
+            <a:ext cx="1853613" cy="461665"/>
+          </a:xfrm>
+          <a:prstGeom prst="rect">
+            <a:avLst/>
+          </a:prstGeom>
+          <a:noFill/>
+        </p:spPr>
+        <p:txBody>
+          <a:bodyPr wrap="square" rtlCol="0">
+            <a:spAutoFit/>
+          </a:bodyPr>
+          <a:lstStyle/>
+          <a:p>
+            <a:pPr algn="ctr"/>
+            <a:r>
+              <a:rPr lang="en-US" sz="1200" dirty="0"/>
+              <a:t>﻿1,6-dihydroxycyclohexa-2,4-diene-dicarboxylate</a:t>
+            </a:r>
+          </a:p>
+        </p:txBody>
+      </p:sp>
+      <p:pic>
+        <p:nvPicPr>
+          <p:cNvPr id="175" name="Picture 174">
+            <a:extLst>
+              <a:ext uri="{FF2B5EF4-FFF2-40B4-BE49-F238E27FC236}">
+                <a16:creationId xmlns:a16="http://schemas.microsoft.com/office/drawing/2014/main" id="{47724008-4E88-0147-BDB3-417ABBD83193}"/>
+              </a:ext>
+            </a:extLst>
+          </p:cNvPr>
+          <p:cNvPicPr>
+            <a:picLocks noChangeAspect="1"/>
+          </p:cNvPicPr>
+          <p:nvPr/>
+        </p:nvPicPr>
+        <p:blipFill>
+          <a:blip r:embed="rId12"/>
+          <a:stretch>
+            <a:fillRect/>
+          </a:stretch>
+        </p:blipFill>
+        <p:spPr>
+          <a:xfrm>
+            <a:off x="2847767" y="5158471"/>
+            <a:ext cx="529200" cy="276908"/>
+          </a:xfrm>
+          <a:prstGeom prst="rect">
+            <a:avLst/>
+          </a:prstGeom>
+        </p:spPr>
+      </p:pic>
+      <p:cxnSp>
+        <p:nvCxnSpPr>
+          <p:cNvPr id="177" name="Straight Arrow Connector 176">
+            <a:extLst>
+              <a:ext uri="{FF2B5EF4-FFF2-40B4-BE49-F238E27FC236}">
+                <a16:creationId xmlns:a16="http://schemas.microsoft.com/office/drawing/2014/main" id="{8BA254C8-FB99-814C-8BAB-7E0FAB22AECC}"/>
+              </a:ext>
+            </a:extLst>
+          </p:cNvPr>
+          <p:cNvCxnSpPr>
+            <a:cxnSpLocks/>
+            <a:stCxn id="174" idx="2"/>
+            <a:endCxn id="139" idx="0"/>
+          </p:cNvCxnSpPr>
+          <p:nvPr/>
+        </p:nvCxnSpPr>
+        <p:spPr>
+          <a:xfrm>
+            <a:off x="3426913" y="5857722"/>
+            <a:ext cx="2384" cy="789075"/>
+          </a:xfrm>
+          <a:prstGeom prst="straightConnector1">
+            <a:avLst/>
+          </a:prstGeom>
+          <a:ln w="28575">
+            <a:solidFill>
+              <a:schemeClr val="tx1"/>
+            </a:solidFill>
+            <a:tailEnd type="triangle"/>
+          </a:ln>
+        </p:spPr>
+        <p:style>
+          <a:lnRef idx="1">
+            <a:schemeClr val="accent1"/>
+          </a:lnRef>
+          <a:fillRef idx="0">
+            <a:schemeClr val="accent1"/>
+          </a:fillRef>
+          <a:effectRef idx="0">
+            <a:schemeClr val="accent1"/>
+          </a:effectRef>
+          <a:fontRef idx="minor">
+            <a:schemeClr val="tx1"/>
+          </a:fontRef>
+        </p:style>
+      </p:cxnSp>
+      <p:cxnSp>
+        <p:nvCxnSpPr>
+          <p:cNvPr id="95" name="Curved Connector 94">
+            <a:extLst>
+              <a:ext uri="{FF2B5EF4-FFF2-40B4-BE49-F238E27FC236}">
+                <a16:creationId xmlns:a16="http://schemas.microsoft.com/office/drawing/2014/main" id="{94F11EB1-BA6E-2247-BCA7-E7E98746E9B4}"/>
+              </a:ext>
+            </a:extLst>
+          </p:cNvPr>
+          <p:cNvCxnSpPr>
+            <a:cxnSpLocks/>
+            <a:endCxn id="77" idx="3"/>
+          </p:cNvCxnSpPr>
+          <p:nvPr/>
+        </p:nvCxnSpPr>
+        <p:spPr>
+          <a:xfrm rot="10800000">
+            <a:off x="1869631" y="1730022"/>
+            <a:ext cx="1581727" cy="1816176"/>
+          </a:xfrm>
+          <a:prstGeom prst="curvedConnector3">
+            <a:avLst>
+              <a:gd name="adj1" fmla="val 59333"/>
+            </a:avLst>
+          </a:prstGeom>
+          <a:ln w="28575">
+            <a:solidFill>
+              <a:schemeClr val="tx1"/>
+            </a:solidFill>
+            <a:tailEnd type="triangle"/>
+          </a:ln>
+        </p:spPr>
+        <p:style>
+          <a:lnRef idx="1">
+            <a:schemeClr val="accent1"/>
+          </a:lnRef>
+          <a:fillRef idx="0">
+            <a:schemeClr val="accent1"/>
+          </a:fillRef>
+          <a:effectRef idx="0">
+            <a:schemeClr val="accent1"/>
+          </a:effectRef>
+          <a:fontRef idx="minor">
+            <a:schemeClr val="tx1"/>
+          </a:fontRef>
+        </p:style>
+      </p:cxnSp>
+      <p:pic>
+        <p:nvPicPr>
+          <p:cNvPr id="2" name="Picture 1">
+            <a:extLst>
+              <a:ext uri="{FF2B5EF4-FFF2-40B4-BE49-F238E27FC236}">
+                <a16:creationId xmlns:a16="http://schemas.microsoft.com/office/drawing/2014/main" id="{5D660342-6A87-EB4F-8756-3A51428A1911}"/>
+              </a:ext>
+            </a:extLst>
+          </p:cNvPr>
+          <p:cNvPicPr>
+            <a:picLocks noChangeAspect="1"/>
+          </p:cNvPicPr>
+          <p:nvPr/>
+        </p:nvPicPr>
+        <p:blipFill>
+          <a:blip r:embed="rId13"/>
+          <a:stretch>
+            <a:fillRect/>
+          </a:stretch>
+        </p:blipFill>
+        <p:spPr>
+          <a:xfrm>
+            <a:off x="2827549" y="7392257"/>
+            <a:ext cx="509034" cy="399711"/>
+          </a:xfrm>
+          <a:prstGeom prst="rect">
+            <a:avLst/>
+          </a:prstGeom>
+        </p:spPr>
+      </p:pic>
+    </p:spTree>
+    <p:extLst>
+      <p:ext uri="{BB962C8B-B14F-4D97-AF65-F5344CB8AC3E}">
+        <p14:creationId xmlns:p14="http://schemas.microsoft.com/office/powerpoint/2010/main" val="1984288247"/>
       </p:ext>
     </p:extLst>
   </p:cSld>

</xml_diff>